<commit_message>
Comments entity, removed Cuisine
</commit_message>
<xml_diff>
--- a/ERdiagram.pptx
+++ b/ERdiagram.pptx
@@ -3097,992 +3097,730 @@
       </p:grpSpPr>
       <p:grpSp>
         <p:nvGrpSpPr>
-          <p:cNvPr id="57" name="Group 56"/>
+          <p:cNvPr id="32" name="Group 31"/>
           <p:cNvGrpSpPr/>
           <p:nvPr/>
         </p:nvGrpSpPr>
         <p:grpSpPr>
           <a:xfrm>
-            <a:off x="1257300" y="562569"/>
-            <a:ext cx="6629400" cy="5129213"/>
-            <a:chOff x="1143000" y="152400"/>
-            <a:chExt cx="6629400" cy="5129213"/>
+            <a:off x="1676400" y="3414111"/>
+            <a:ext cx="6794500" cy="1232598"/>
+            <a:chOff x="762000" y="2817909"/>
+            <a:chExt cx="6794500" cy="1232598"/>
           </a:xfrm>
         </p:grpSpPr>
-        <p:grpSp>
-          <p:nvGrpSpPr>
-            <p:cNvPr id="32" name="Group 31"/>
-            <p:cNvGrpSpPr/>
+        <p:sp>
+          <p:nvSpPr>
+            <p:cNvPr id="6" name="TextBox 5"/>
+            <p:cNvSpPr txBox="1"/>
             <p:nvPr/>
-          </p:nvGrpSpPr>
-          <p:grpSpPr>
+          </p:nvSpPr>
+          <p:spPr>
             <a:xfrm>
-              <a:off x="1143000" y="2511623"/>
-              <a:ext cx="6629400" cy="2769990"/>
-              <a:chOff x="762000" y="1896070"/>
-              <a:chExt cx="6629400" cy="2769990"/>
+              <a:off x="762000" y="2819400"/>
+              <a:ext cx="1371600" cy="923330"/>
             </a:xfrm>
-          </p:grpSpPr>
-          <p:sp>
-            <p:nvSpPr>
-              <p:cNvPr id="6" name="TextBox 5"/>
-              <p:cNvSpPr txBox="1"/>
-              <p:nvPr/>
-            </p:nvSpPr>
-            <p:spPr>
-              <a:xfrm>
-                <a:off x="762000" y="2819400"/>
-                <a:ext cx="1371600" cy="923330"/>
-              </a:xfrm>
-              <a:prstGeom prst="rect">
-                <a:avLst/>
-              </a:prstGeom>
+            <a:prstGeom prst="rect">
+              <a:avLst/>
+            </a:prstGeom>
+            <a:solidFill>
+              <a:srgbClr val="92D050"/>
+            </a:solidFill>
+            <a:ln w="25400">
               <a:solidFill>
-                <a:srgbClr val="92D050"/>
+                <a:schemeClr val="tx1"/>
               </a:solidFill>
-              <a:ln w="25400">
-                <a:solidFill>
-                  <a:schemeClr val="tx1"/>
-                </a:solidFill>
-              </a:ln>
-            </p:spPr>
-            <p:txBody>
-              <a:bodyPr wrap="square" rtlCol="0">
-                <a:spAutoFit/>
-              </a:bodyPr>
-              <a:lstStyle/>
-              <a:p>
-                <a:pPr algn="ctr"/>
-                <a:endParaRPr lang="en-GB" b="1" dirty="0" smtClean="0"/>
-              </a:p>
-              <a:p>
-                <a:pPr algn="ctr"/>
-                <a:r>
-                  <a:rPr lang="en-GB" b="1" dirty="0" smtClean="0"/>
-                  <a:t>User</a:t>
-                </a:r>
-              </a:p>
-              <a:p>
-                <a:endParaRPr lang="en-GB" b="1" dirty="0"/>
-              </a:p>
-            </p:txBody>
-          </p:sp>
-          <p:sp>
-            <p:nvSpPr>
-              <p:cNvPr id="7" name="TextBox 6"/>
-              <p:cNvSpPr txBox="1"/>
-              <p:nvPr/>
-            </p:nvSpPr>
-            <p:spPr>
-              <a:xfrm>
-                <a:off x="3505200" y="2819400"/>
-                <a:ext cx="1371600" cy="923330"/>
-              </a:xfrm>
-              <a:prstGeom prst="rect">
-                <a:avLst/>
-              </a:prstGeom>
+            </a:ln>
+          </p:spPr>
+          <p:txBody>
+            <a:bodyPr wrap="square" rtlCol="0">
+              <a:spAutoFit/>
+            </a:bodyPr>
+            <a:lstStyle/>
+            <a:p>
+              <a:pPr algn="ctr"/>
+              <a:endParaRPr lang="en-GB" b="1" dirty="0" smtClean="0"/>
+            </a:p>
+            <a:p>
+              <a:pPr algn="ctr"/>
+              <a:r>
+                <a:rPr lang="en-GB" b="1" dirty="0" smtClean="0"/>
+                <a:t>User</a:t>
+              </a:r>
+            </a:p>
+            <a:p>
+              <a:endParaRPr lang="en-GB" b="1" dirty="0"/>
+            </a:p>
+          </p:txBody>
+        </p:sp>
+        <p:sp>
+          <p:nvSpPr>
+            <p:cNvPr id="7" name="TextBox 6"/>
+            <p:cNvSpPr txBox="1"/>
+            <p:nvPr/>
+          </p:nvSpPr>
+          <p:spPr>
+            <a:xfrm>
+              <a:off x="3505200" y="2819400"/>
+              <a:ext cx="1371600" cy="923330"/>
+            </a:xfrm>
+            <a:prstGeom prst="rect">
+              <a:avLst/>
+            </a:prstGeom>
+            <a:solidFill>
+              <a:srgbClr val="92D050"/>
+            </a:solidFill>
+            <a:ln w="25400">
               <a:solidFill>
-                <a:srgbClr val="92D050"/>
+                <a:schemeClr val="tx1"/>
               </a:solidFill>
-              <a:ln w="25400">
-                <a:solidFill>
-                  <a:schemeClr val="tx1"/>
-                </a:solidFill>
-              </a:ln>
-            </p:spPr>
-            <p:txBody>
-              <a:bodyPr wrap="square" rtlCol="0">
-                <a:spAutoFit/>
-              </a:bodyPr>
-              <a:lstStyle/>
-              <a:p>
-                <a:pPr algn="ctr"/>
-                <a:endParaRPr lang="en-GB" b="1" dirty="0" smtClean="0"/>
-              </a:p>
-              <a:p>
-                <a:pPr algn="ctr"/>
-                <a:r>
-                  <a:rPr lang="en-GB" b="1" dirty="0" smtClean="0"/>
-                  <a:t>Recipe</a:t>
-                </a:r>
-              </a:p>
-              <a:p>
-                <a:endParaRPr lang="en-GB" b="1" dirty="0"/>
-              </a:p>
-            </p:txBody>
-          </p:sp>
-          <p:sp>
-            <p:nvSpPr>
-              <p:cNvPr id="8" name="TextBox 7"/>
-              <p:cNvSpPr txBox="1"/>
-              <p:nvPr/>
-            </p:nvSpPr>
-            <p:spPr>
-              <a:xfrm>
-                <a:off x="6019800" y="3742730"/>
-                <a:ext cx="1371600" cy="923330"/>
-              </a:xfrm>
-              <a:prstGeom prst="rect">
-                <a:avLst/>
-              </a:prstGeom>
+            </a:ln>
+          </p:spPr>
+          <p:txBody>
+            <a:bodyPr wrap="square" rtlCol="0">
+              <a:spAutoFit/>
+            </a:bodyPr>
+            <a:lstStyle/>
+            <a:p>
+              <a:pPr algn="ctr"/>
+              <a:endParaRPr lang="en-GB" b="1" dirty="0" smtClean="0"/>
+            </a:p>
+            <a:p>
+              <a:pPr algn="ctr"/>
+              <a:r>
+                <a:rPr lang="en-GB" b="1" dirty="0" smtClean="0"/>
+                <a:t>Recipe</a:t>
+              </a:r>
+            </a:p>
+            <a:p>
+              <a:endParaRPr lang="en-GB" b="1" dirty="0"/>
+            </a:p>
+          </p:txBody>
+        </p:sp>
+        <p:sp>
+          <p:nvSpPr>
+            <p:cNvPr id="8" name="TextBox 7"/>
+            <p:cNvSpPr txBox="1"/>
+            <p:nvPr/>
+          </p:nvSpPr>
+          <p:spPr>
+            <a:xfrm>
+              <a:off x="6184900" y="2817909"/>
+              <a:ext cx="1371600" cy="923330"/>
+            </a:xfrm>
+            <a:prstGeom prst="rect">
+              <a:avLst/>
+            </a:prstGeom>
+            <a:solidFill>
+              <a:srgbClr val="92D050"/>
+            </a:solidFill>
+            <a:ln w="25400">
               <a:solidFill>
-                <a:srgbClr val="92D050"/>
+                <a:schemeClr val="tx1"/>
               </a:solidFill>
-              <a:ln w="25400">
-                <a:solidFill>
-                  <a:schemeClr val="tx1"/>
-                </a:solidFill>
-              </a:ln>
-            </p:spPr>
-            <p:txBody>
-              <a:bodyPr wrap="square" rtlCol="0">
-                <a:spAutoFit/>
-              </a:bodyPr>
-              <a:lstStyle/>
-              <a:p>
-                <a:pPr algn="ctr"/>
-                <a:endParaRPr lang="en-GB" b="1" dirty="0" smtClean="0"/>
-              </a:p>
-              <a:p>
-                <a:pPr algn="ctr"/>
-                <a:r>
-                  <a:rPr lang="en-GB" b="1" dirty="0" smtClean="0"/>
-                  <a:t>Category</a:t>
-                </a:r>
-              </a:p>
-              <a:p>
-                <a:endParaRPr lang="en-GB" b="1" dirty="0"/>
-              </a:p>
-            </p:txBody>
-          </p:sp>
-          <p:sp>
-            <p:nvSpPr>
-              <p:cNvPr id="9" name="TextBox 8"/>
-              <p:cNvSpPr txBox="1"/>
-              <p:nvPr/>
-            </p:nvSpPr>
-            <p:spPr>
-              <a:xfrm>
-                <a:off x="6019800" y="1896070"/>
-                <a:ext cx="1371600" cy="923330"/>
-              </a:xfrm>
-              <a:prstGeom prst="rect">
-                <a:avLst/>
-              </a:prstGeom>
+            </a:ln>
+          </p:spPr>
+          <p:txBody>
+            <a:bodyPr wrap="square" rtlCol="0">
+              <a:spAutoFit/>
+            </a:bodyPr>
+            <a:lstStyle/>
+            <a:p>
+              <a:pPr algn="ctr"/>
+              <a:endParaRPr lang="en-GB" b="1" dirty="0" smtClean="0"/>
+            </a:p>
+            <a:p>
+              <a:pPr algn="ctr"/>
+              <a:r>
+                <a:rPr lang="en-GB" b="1" dirty="0" smtClean="0"/>
+                <a:t>Category</a:t>
+              </a:r>
+            </a:p>
+            <a:p>
+              <a:endParaRPr lang="en-GB" b="1" dirty="0"/>
+            </a:p>
+          </p:txBody>
+        </p:sp>
+        <p:cxnSp>
+          <p:nvCxnSpPr>
+            <p:cNvPr id="11" name="Straight Connector 10"/>
+            <p:cNvCxnSpPr>
+              <a:stCxn id="6" idx="3"/>
+              <a:endCxn id="7" idx="1"/>
+            </p:cNvCxnSpPr>
+            <p:nvPr/>
+          </p:nvCxnSpPr>
+          <p:spPr>
+            <a:xfrm>
+              <a:off x="2133600" y="3281065"/>
+              <a:ext cx="1371600" cy="0"/>
+            </a:xfrm>
+            <a:prstGeom prst="line">
+              <a:avLst/>
+            </a:prstGeom>
+            <a:ln w="25400">
               <a:solidFill>
-                <a:srgbClr val="92D050"/>
+                <a:schemeClr val="tx1"/>
               </a:solidFill>
-              <a:ln w="25400">
-                <a:solidFill>
-                  <a:schemeClr val="tx1"/>
-                </a:solidFill>
-              </a:ln>
-            </p:spPr>
-            <p:txBody>
-              <a:bodyPr wrap="square" rtlCol="0">
-                <a:spAutoFit/>
-              </a:bodyPr>
-              <a:lstStyle/>
-              <a:p>
-                <a:pPr algn="ctr"/>
-                <a:endParaRPr lang="en-GB" b="1" dirty="0" smtClean="0"/>
-              </a:p>
-              <a:p>
-                <a:pPr algn="ctr"/>
-                <a:r>
-                  <a:rPr lang="en-GB" b="1" dirty="0"/>
-                  <a:t>C</a:t>
-                </a:r>
-                <a:r>
-                  <a:rPr lang="en-GB" b="1" dirty="0" smtClean="0"/>
-                  <a:t>uisine</a:t>
-                </a:r>
-              </a:p>
-              <a:p>
-                <a:endParaRPr lang="en-GB" b="1" dirty="0"/>
-              </a:p>
-            </p:txBody>
-          </p:sp>
-          <p:cxnSp>
-            <p:nvCxnSpPr>
-              <p:cNvPr id="11" name="Straight Connector 10"/>
-              <p:cNvCxnSpPr>
-                <a:stCxn id="6" idx="3"/>
-                <a:endCxn id="7" idx="1"/>
-              </p:cNvCxnSpPr>
-              <p:nvPr/>
-            </p:nvCxnSpPr>
-            <p:spPr>
-              <a:xfrm>
-                <a:off x="2133600" y="3281065"/>
-                <a:ext cx="1371600" cy="0"/>
-              </a:xfrm>
-              <a:prstGeom prst="line">
-                <a:avLst/>
-              </a:prstGeom>
-              <a:ln w="25400">
-                <a:solidFill>
-                  <a:schemeClr val="tx1"/>
-                </a:solidFill>
-              </a:ln>
-            </p:spPr>
-            <p:style>
-              <a:lnRef idx="1">
-                <a:schemeClr val="accent1"/>
-              </a:lnRef>
-              <a:fillRef idx="0">
-                <a:schemeClr val="accent1"/>
-              </a:fillRef>
-              <a:effectRef idx="0">
-                <a:schemeClr val="accent1"/>
-              </a:effectRef>
-              <a:fontRef idx="minor">
+            </a:ln>
+          </p:spPr>
+          <p:style>
+            <a:lnRef idx="1">
+              <a:schemeClr val="accent1"/>
+            </a:lnRef>
+            <a:fillRef idx="0">
+              <a:schemeClr val="accent1"/>
+            </a:fillRef>
+            <a:effectRef idx="0">
+              <a:schemeClr val="accent1"/>
+            </a:effectRef>
+            <a:fontRef idx="minor">
+              <a:schemeClr val="tx1"/>
+            </a:fontRef>
+          </p:style>
+        </p:cxnSp>
+        <p:cxnSp>
+          <p:nvCxnSpPr>
+            <p:cNvPr id="12" name="Straight Connector 11"/>
+            <p:cNvCxnSpPr>
+              <a:stCxn id="7" idx="3"/>
+              <a:endCxn id="8" idx="1"/>
+            </p:cNvCxnSpPr>
+            <p:nvPr/>
+          </p:nvCxnSpPr>
+          <p:spPr>
+            <a:xfrm flipV="1">
+              <a:off x="4876800" y="3279574"/>
+              <a:ext cx="1308100" cy="1491"/>
+            </a:xfrm>
+            <a:prstGeom prst="line">
+              <a:avLst/>
+            </a:prstGeom>
+            <a:ln w="25400">
+              <a:solidFill>
                 <a:schemeClr val="tx1"/>
-              </a:fontRef>
-            </p:style>
-          </p:cxnSp>
-          <p:cxnSp>
-            <p:nvCxnSpPr>
-              <p:cNvPr id="12" name="Straight Connector 11"/>
-              <p:cNvCxnSpPr>
-                <a:endCxn id="8" idx="1"/>
-              </p:cNvCxnSpPr>
-              <p:nvPr/>
-            </p:nvCxnSpPr>
-            <p:spPr>
-              <a:xfrm>
-                <a:off x="4876800" y="3657600"/>
-                <a:ext cx="1143000" cy="546795"/>
-              </a:xfrm>
-              <a:prstGeom prst="line">
-                <a:avLst/>
-              </a:prstGeom>
-              <a:ln w="25400">
-                <a:solidFill>
-                  <a:schemeClr val="tx1"/>
-                </a:solidFill>
-              </a:ln>
-            </p:spPr>
-            <p:style>
-              <a:lnRef idx="1">
-                <a:schemeClr val="accent1"/>
-              </a:lnRef>
-              <a:fillRef idx="0">
-                <a:schemeClr val="accent1"/>
-              </a:fillRef>
-              <a:effectRef idx="0">
-                <a:schemeClr val="accent1"/>
-              </a:effectRef>
-              <a:fontRef idx="minor">
+              </a:solidFill>
+            </a:ln>
+          </p:spPr>
+          <p:style>
+            <a:lnRef idx="1">
+              <a:schemeClr val="accent1"/>
+            </a:lnRef>
+            <a:fillRef idx="0">
+              <a:schemeClr val="accent1"/>
+            </a:fillRef>
+            <a:effectRef idx="0">
+              <a:schemeClr val="accent1"/>
+            </a:effectRef>
+            <a:fontRef idx="minor">
+              <a:schemeClr val="tx1"/>
+            </a:fontRef>
+          </p:style>
+        </p:cxnSp>
+        <p:sp>
+          <p:nvSpPr>
+            <p:cNvPr id="18" name="TextBox 17"/>
+            <p:cNvSpPr txBox="1"/>
+            <p:nvPr/>
+          </p:nvSpPr>
+          <p:spPr>
+            <a:xfrm>
+              <a:off x="3200400" y="2971799"/>
+              <a:ext cx="304800" cy="307777"/>
+            </a:xfrm>
+            <a:prstGeom prst="rect">
+              <a:avLst/>
+            </a:prstGeom>
+            <a:noFill/>
+          </p:spPr>
+          <p:txBody>
+            <a:bodyPr wrap="square" rtlCol="0">
+              <a:spAutoFit/>
+            </a:bodyPr>
+            <a:lstStyle/>
+            <a:p>
+              <a:r>
+                <a:rPr lang="en-GB" sz="1400" b="1" dirty="0"/>
+                <a:t>M</a:t>
+              </a:r>
+            </a:p>
+          </p:txBody>
+        </p:sp>
+        <p:sp>
+          <p:nvSpPr>
+            <p:cNvPr id="20" name="TextBox 19"/>
+            <p:cNvSpPr txBox="1"/>
+            <p:nvPr/>
+          </p:nvSpPr>
+          <p:spPr>
+            <a:xfrm>
+              <a:off x="2133600" y="2971800"/>
+              <a:ext cx="304800" cy="307777"/>
+            </a:xfrm>
+            <a:prstGeom prst="rect">
+              <a:avLst/>
+            </a:prstGeom>
+            <a:noFill/>
+          </p:spPr>
+          <p:txBody>
+            <a:bodyPr wrap="square" rtlCol="0">
+              <a:spAutoFit/>
+            </a:bodyPr>
+            <a:lstStyle/>
+            <a:p>
+              <a:r>
+                <a:rPr lang="en-GB" sz="1400" b="1" dirty="0" smtClean="0"/>
+                <a:t>1</a:t>
+              </a:r>
+              <a:endParaRPr lang="en-GB" sz="1400" b="1" dirty="0"/>
+            </a:p>
+          </p:txBody>
+        </p:sp>
+        <p:sp>
+          <p:nvSpPr>
+            <p:cNvPr id="22" name="TextBox 21"/>
+            <p:cNvSpPr txBox="1"/>
+            <p:nvPr/>
+          </p:nvSpPr>
+          <p:spPr>
+            <a:xfrm>
+              <a:off x="4864100" y="2973288"/>
+              <a:ext cx="304800" cy="307777"/>
+            </a:xfrm>
+            <a:prstGeom prst="rect">
+              <a:avLst/>
+            </a:prstGeom>
+            <a:noFill/>
+          </p:spPr>
+          <p:txBody>
+            <a:bodyPr wrap="square" rtlCol="0">
+              <a:spAutoFit/>
+            </a:bodyPr>
+            <a:lstStyle/>
+            <a:p>
+              <a:r>
+                <a:rPr lang="en-GB" sz="1400" b="1" dirty="0"/>
+                <a:t>M</a:t>
+              </a:r>
+            </a:p>
+          </p:txBody>
+        </p:sp>
+        <p:sp>
+          <p:nvSpPr>
+            <p:cNvPr id="23" name="TextBox 22"/>
+            <p:cNvSpPr txBox="1"/>
+            <p:nvPr/>
+          </p:nvSpPr>
+          <p:spPr>
+            <a:xfrm>
+              <a:off x="3911600" y="3742730"/>
+              <a:ext cx="304800" cy="307777"/>
+            </a:xfrm>
+            <a:prstGeom prst="rect">
+              <a:avLst/>
+            </a:prstGeom>
+            <a:noFill/>
+          </p:spPr>
+          <p:txBody>
+            <a:bodyPr wrap="square" rtlCol="0">
+              <a:spAutoFit/>
+            </a:bodyPr>
+            <a:lstStyle/>
+            <a:p>
+              <a:r>
+                <a:rPr lang="en-GB" sz="1400" b="1" dirty="0" smtClean="0"/>
+                <a:t>1</a:t>
+              </a:r>
+              <a:endParaRPr lang="en-GB" sz="1400" b="1" dirty="0"/>
+            </a:p>
+          </p:txBody>
+        </p:sp>
+      </p:grpSp>
+      <p:grpSp>
+        <p:nvGrpSpPr>
+          <p:cNvPr id="28" name="Group 27"/>
+          <p:cNvGrpSpPr/>
+          <p:nvPr/>
+        </p:nvGrpSpPr>
+        <p:grpSpPr>
+          <a:xfrm>
+            <a:off x="1752600" y="2585888"/>
+            <a:ext cx="1219200" cy="829714"/>
+            <a:chOff x="838200" y="2065346"/>
+            <a:chExt cx="1219200" cy="829714"/>
+          </a:xfrm>
+        </p:grpSpPr>
+        <p:sp>
+          <p:nvSpPr>
+            <p:cNvPr id="25" name="TextBox 24"/>
+            <p:cNvSpPr txBox="1"/>
+            <p:nvPr/>
+          </p:nvSpPr>
+          <p:spPr>
+            <a:xfrm>
+              <a:off x="838200" y="2065346"/>
+              <a:ext cx="1219200" cy="646331"/>
+            </a:xfrm>
+            <a:prstGeom prst="rect">
+              <a:avLst/>
+            </a:prstGeom>
+            <a:solidFill>
+              <a:schemeClr val="accent3">
+                <a:lumMod val="60000"/>
+                <a:lumOff val="40000"/>
+              </a:schemeClr>
+            </a:solidFill>
+            <a:ln w="12700">
+              <a:solidFill>
                 <a:schemeClr val="tx1"/>
-              </a:fontRef>
-            </p:style>
-          </p:cxnSp>
-          <p:cxnSp>
-            <p:nvCxnSpPr>
-              <p:cNvPr id="15" name="Straight Connector 14"/>
-              <p:cNvCxnSpPr>
-                <a:endCxn id="9" idx="1"/>
-              </p:cNvCxnSpPr>
-              <p:nvPr/>
-            </p:nvCxnSpPr>
-            <p:spPr>
-              <a:xfrm flipV="1">
-                <a:off x="4876800" y="2357735"/>
-                <a:ext cx="1143000" cy="614065"/>
-              </a:xfrm>
-              <a:prstGeom prst="line">
-                <a:avLst/>
-              </a:prstGeom>
-              <a:ln w="25400">
-                <a:solidFill>
-                  <a:schemeClr val="tx1"/>
-                </a:solidFill>
-              </a:ln>
-            </p:spPr>
-            <p:style>
-              <a:lnRef idx="1">
-                <a:schemeClr val="accent1"/>
-              </a:lnRef>
-              <a:fillRef idx="0">
-                <a:schemeClr val="accent1"/>
-              </a:fillRef>
-              <a:effectRef idx="0">
-                <a:schemeClr val="accent1"/>
-              </a:effectRef>
-              <a:fontRef idx="minor">
+              </a:solidFill>
+            </a:ln>
+          </p:spPr>
+          <p:txBody>
+            <a:bodyPr wrap="square" rtlCol="0">
+              <a:spAutoFit/>
+            </a:bodyPr>
+            <a:lstStyle/>
+            <a:p>
+              <a:pPr algn="ctr"/>
+              <a:r>
+                <a:rPr lang="en-GB" sz="1200" u="sng" dirty="0" smtClean="0"/>
+                <a:t>Username (PK)</a:t>
+              </a:r>
+            </a:p>
+            <a:p>
+              <a:pPr algn="ctr"/>
+              <a:r>
+                <a:rPr lang="en-GB" sz="1200" dirty="0" smtClean="0"/>
+                <a:t>Email Address</a:t>
+              </a:r>
+            </a:p>
+            <a:p>
+              <a:pPr algn="ctr"/>
+              <a:r>
+                <a:rPr lang="en-GB" sz="1200" dirty="0" smtClean="0"/>
+                <a:t>Password</a:t>
+              </a:r>
+            </a:p>
+          </p:txBody>
+        </p:sp>
+        <p:cxnSp>
+          <p:nvCxnSpPr>
+            <p:cNvPr id="27" name="Straight Connector 26"/>
+            <p:cNvCxnSpPr>
+              <a:stCxn id="6" idx="0"/>
+              <a:endCxn id="25" idx="2"/>
+            </p:cNvCxnSpPr>
+            <p:nvPr/>
+          </p:nvCxnSpPr>
+          <p:spPr>
+            <a:xfrm flipV="1">
+              <a:off x="1447800" y="2711677"/>
+              <a:ext cx="0" cy="183383"/>
+            </a:xfrm>
+            <a:prstGeom prst="line">
+              <a:avLst/>
+            </a:prstGeom>
+            <a:ln w="12700">
+              <a:solidFill>
                 <a:schemeClr val="tx1"/>
-              </a:fontRef>
-            </p:style>
-          </p:cxnSp>
-          <p:sp>
-            <p:nvSpPr>
-              <p:cNvPr id="18" name="TextBox 17"/>
-              <p:cNvSpPr txBox="1"/>
-              <p:nvPr/>
-            </p:nvSpPr>
-            <p:spPr>
-              <a:xfrm>
-                <a:off x="3200400" y="2971799"/>
-                <a:ext cx="304800" cy="307777"/>
-              </a:xfrm>
-              <a:prstGeom prst="rect">
-                <a:avLst/>
-              </a:prstGeom>
-              <a:noFill/>
-            </p:spPr>
-            <p:txBody>
-              <a:bodyPr wrap="square" rtlCol="0">
-                <a:spAutoFit/>
-              </a:bodyPr>
-              <a:lstStyle/>
-              <a:p>
-                <a:r>
-                  <a:rPr lang="en-GB" sz="1400" b="1" dirty="0"/>
-                  <a:t>M</a:t>
-                </a:r>
-              </a:p>
-            </p:txBody>
-          </p:sp>
-          <p:sp>
-            <p:nvSpPr>
-              <p:cNvPr id="20" name="TextBox 19"/>
-              <p:cNvSpPr txBox="1"/>
-              <p:nvPr/>
-            </p:nvSpPr>
-            <p:spPr>
-              <a:xfrm>
-                <a:off x="2133600" y="2971800"/>
-                <a:ext cx="304800" cy="307777"/>
-              </a:xfrm>
-              <a:prstGeom prst="rect">
-                <a:avLst/>
-              </a:prstGeom>
-              <a:noFill/>
-            </p:spPr>
-            <p:txBody>
-              <a:bodyPr wrap="square" rtlCol="0">
-                <a:spAutoFit/>
-              </a:bodyPr>
-              <a:lstStyle/>
-              <a:p>
-                <a:r>
-                  <a:rPr lang="en-GB" sz="1400" b="1" dirty="0" smtClean="0"/>
-                  <a:t>1</a:t>
-                </a:r>
-                <a:endParaRPr lang="en-GB" sz="1400" b="1" dirty="0"/>
-              </a:p>
-            </p:txBody>
-          </p:sp>
-          <p:sp>
-            <p:nvSpPr>
-              <p:cNvPr id="21" name="TextBox 20"/>
-              <p:cNvSpPr txBox="1"/>
-              <p:nvPr/>
-            </p:nvSpPr>
-            <p:spPr>
-              <a:xfrm>
-                <a:off x="4876800" y="2511623"/>
-                <a:ext cx="304800" cy="307777"/>
-              </a:xfrm>
-              <a:prstGeom prst="rect">
-                <a:avLst/>
-              </a:prstGeom>
-              <a:noFill/>
-            </p:spPr>
-            <p:txBody>
-              <a:bodyPr wrap="square" rtlCol="0">
-                <a:spAutoFit/>
-              </a:bodyPr>
-              <a:lstStyle/>
-              <a:p>
-                <a:r>
-                  <a:rPr lang="en-GB" sz="1400" b="1" dirty="0"/>
-                  <a:t>M</a:t>
-                </a:r>
-              </a:p>
-            </p:txBody>
-          </p:sp>
-          <p:sp>
-            <p:nvSpPr>
-              <p:cNvPr id="22" name="TextBox 21"/>
-              <p:cNvSpPr txBox="1"/>
-              <p:nvPr/>
-            </p:nvSpPr>
-            <p:spPr>
-              <a:xfrm>
-                <a:off x="4876800" y="3777108"/>
-                <a:ext cx="304800" cy="307777"/>
-              </a:xfrm>
-              <a:prstGeom prst="rect">
-                <a:avLst/>
-              </a:prstGeom>
-              <a:noFill/>
-            </p:spPr>
-            <p:txBody>
-              <a:bodyPr wrap="square" rtlCol="0">
-                <a:spAutoFit/>
-              </a:bodyPr>
-              <a:lstStyle/>
-              <a:p>
-                <a:r>
-                  <a:rPr lang="en-GB" sz="1400" b="1" dirty="0"/>
-                  <a:t>M</a:t>
-                </a:r>
-              </a:p>
-            </p:txBody>
-          </p:sp>
-          <p:sp>
-            <p:nvSpPr>
-              <p:cNvPr id="23" name="TextBox 22"/>
-              <p:cNvSpPr txBox="1"/>
-              <p:nvPr/>
-            </p:nvSpPr>
-            <p:spPr>
-              <a:xfrm>
-                <a:off x="5715000" y="4172736"/>
-                <a:ext cx="304800" cy="307777"/>
-              </a:xfrm>
-              <a:prstGeom prst="rect">
-                <a:avLst/>
-              </a:prstGeom>
-              <a:noFill/>
-            </p:spPr>
-            <p:txBody>
-              <a:bodyPr wrap="square" rtlCol="0">
-                <a:spAutoFit/>
-              </a:bodyPr>
-              <a:lstStyle/>
-              <a:p>
-                <a:r>
-                  <a:rPr lang="en-GB" sz="1400" b="1" dirty="0" smtClean="0"/>
-                  <a:t>1</a:t>
-                </a:r>
-                <a:endParaRPr lang="en-GB" sz="1400" b="1" dirty="0"/>
-              </a:p>
-            </p:txBody>
-          </p:sp>
-          <p:sp>
-            <p:nvSpPr>
-              <p:cNvPr id="24" name="TextBox 23"/>
-              <p:cNvSpPr txBox="1"/>
-              <p:nvPr/>
-            </p:nvSpPr>
-            <p:spPr>
-              <a:xfrm>
-                <a:off x="5721927" y="2049958"/>
-                <a:ext cx="304800" cy="307777"/>
-              </a:xfrm>
-              <a:prstGeom prst="rect">
-                <a:avLst/>
-              </a:prstGeom>
-              <a:noFill/>
-            </p:spPr>
-            <p:txBody>
-              <a:bodyPr wrap="square" rtlCol="0">
-                <a:spAutoFit/>
-              </a:bodyPr>
-              <a:lstStyle/>
-              <a:p>
-                <a:r>
-                  <a:rPr lang="en-GB" sz="1400" b="1" dirty="0" smtClean="0"/>
-                  <a:t>1</a:t>
-                </a:r>
-                <a:endParaRPr lang="en-GB" sz="1400" b="1" dirty="0"/>
-              </a:p>
-            </p:txBody>
-          </p:sp>
-        </p:grpSp>
-        <p:grpSp>
-          <p:nvGrpSpPr>
-            <p:cNvPr id="28" name="Group 27"/>
-            <p:cNvGrpSpPr/>
+              </a:solidFill>
+            </a:ln>
+          </p:spPr>
+          <p:style>
+            <a:lnRef idx="1">
+              <a:schemeClr val="accent1"/>
+            </a:lnRef>
+            <a:fillRef idx="0">
+              <a:schemeClr val="accent1"/>
+            </a:fillRef>
+            <a:effectRef idx="0">
+              <a:schemeClr val="accent1"/>
+            </a:effectRef>
+            <a:fontRef idx="minor">
+              <a:schemeClr val="tx1"/>
+            </a:fontRef>
+          </p:style>
+        </p:cxnSp>
+      </p:grpSp>
+      <p:grpSp>
+        <p:nvGrpSpPr>
+          <p:cNvPr id="29" name="Group 28"/>
+          <p:cNvGrpSpPr/>
+          <p:nvPr/>
+        </p:nvGrpSpPr>
+        <p:grpSpPr>
+          <a:xfrm>
+            <a:off x="4495800" y="133049"/>
+            <a:ext cx="1219200" cy="3282554"/>
+            <a:chOff x="838200" y="2065345"/>
+            <a:chExt cx="1219200" cy="830766"/>
+          </a:xfrm>
+        </p:grpSpPr>
+        <p:sp>
+          <p:nvSpPr>
+            <p:cNvPr id="30" name="TextBox 29"/>
+            <p:cNvSpPr txBox="1"/>
             <p:nvPr/>
-          </p:nvGrpSpPr>
-          <p:grpSpPr>
+          </p:nvSpPr>
+          <p:spPr>
             <a:xfrm>
-              <a:off x="1219200" y="2605239"/>
-              <a:ext cx="1219200" cy="829714"/>
-              <a:chOff x="838200" y="2065346"/>
-              <a:chExt cx="1219200" cy="829714"/>
+              <a:off x="838200" y="2065345"/>
+              <a:ext cx="1219200" cy="630939"/>
             </a:xfrm>
-          </p:grpSpPr>
-          <p:sp>
-            <p:nvSpPr>
-              <p:cNvPr id="25" name="TextBox 24"/>
-              <p:cNvSpPr txBox="1"/>
-              <p:nvPr/>
-            </p:nvSpPr>
-            <p:spPr>
-              <a:xfrm>
-                <a:off x="838200" y="2065346"/>
-                <a:ext cx="1219200" cy="646331"/>
-              </a:xfrm>
-              <a:prstGeom prst="rect">
-                <a:avLst/>
-              </a:prstGeom>
+            <a:prstGeom prst="rect">
+              <a:avLst/>
+            </a:prstGeom>
+            <a:solidFill>
+              <a:schemeClr val="accent3">
+                <a:lumMod val="60000"/>
+                <a:lumOff val="40000"/>
+              </a:schemeClr>
+            </a:solidFill>
+            <a:ln w="12700">
               <a:solidFill>
-                <a:schemeClr val="accent3">
-                  <a:lumMod val="60000"/>
-                  <a:lumOff val="40000"/>
-                </a:schemeClr>
+                <a:schemeClr val="tx1"/>
               </a:solidFill>
-              <a:ln w="12700">
-                <a:solidFill>
-                  <a:schemeClr val="tx1"/>
-                </a:solidFill>
-              </a:ln>
-            </p:spPr>
-            <p:txBody>
-              <a:bodyPr wrap="square" rtlCol="0">
-                <a:spAutoFit/>
-              </a:bodyPr>
-              <a:lstStyle/>
-              <a:p>
-                <a:pPr algn="ctr"/>
-                <a:r>
-                  <a:rPr lang="en-GB" sz="1200" u="sng" dirty="0" smtClean="0"/>
-                  <a:t>Username (PK)</a:t>
-                </a:r>
-              </a:p>
-              <a:p>
-                <a:pPr algn="ctr"/>
-                <a:r>
-                  <a:rPr lang="en-GB" sz="1200" dirty="0" smtClean="0"/>
-                  <a:t>Email Address</a:t>
-                </a:r>
-              </a:p>
-              <a:p>
-                <a:pPr algn="ctr"/>
-                <a:r>
-                  <a:rPr lang="en-GB" sz="1200" dirty="0" smtClean="0"/>
-                  <a:t>Password</a:t>
-                </a:r>
-              </a:p>
-            </p:txBody>
-          </p:sp>
-          <p:cxnSp>
-            <p:nvCxnSpPr>
-              <p:cNvPr id="27" name="Straight Connector 26"/>
-              <p:cNvCxnSpPr>
-                <a:stCxn id="6" idx="0"/>
-                <a:endCxn id="25" idx="2"/>
-              </p:cNvCxnSpPr>
-              <p:nvPr/>
-            </p:nvCxnSpPr>
-            <p:spPr>
-              <a:xfrm flipV="1">
-                <a:off x="1447800" y="2711677"/>
-                <a:ext cx="0" cy="183383"/>
-              </a:xfrm>
-              <a:prstGeom prst="line">
-                <a:avLst/>
-              </a:prstGeom>
-              <a:ln w="12700">
-                <a:solidFill>
-                  <a:schemeClr val="tx1"/>
-                </a:solidFill>
-              </a:ln>
-            </p:spPr>
-            <p:style>
-              <a:lnRef idx="1">
-                <a:schemeClr val="accent1"/>
-              </a:lnRef>
-              <a:fillRef idx="0">
-                <a:schemeClr val="accent1"/>
-              </a:fillRef>
-              <a:effectRef idx="0">
-                <a:schemeClr val="accent1"/>
-              </a:effectRef>
-              <a:fontRef idx="minor">
+            </a:ln>
+          </p:spPr>
+          <p:txBody>
+            <a:bodyPr wrap="square" rtlCol="0">
+              <a:spAutoFit/>
+            </a:bodyPr>
+            <a:lstStyle/>
+            <a:p>
+              <a:pPr algn="ctr"/>
+              <a:r>
+                <a:rPr lang="en-GB" sz="1200" u="sng" dirty="0" smtClean="0"/>
+                <a:t>Name (PK)</a:t>
+              </a:r>
+            </a:p>
+            <a:p>
+              <a:pPr algn="ctr"/>
+              <a:r>
+                <a:rPr lang="en-GB" sz="1200" u="sng" dirty="0" smtClean="0"/>
+                <a:t>User(FK)</a:t>
+              </a:r>
+            </a:p>
+            <a:p>
+              <a:pPr algn="ctr"/>
+              <a:r>
+                <a:rPr lang="en-GB" sz="1200" dirty="0" smtClean="0"/>
+                <a:t>Ingredients</a:t>
+              </a:r>
+              <a:endParaRPr lang="en-GB" sz="1200" dirty="0"/>
+            </a:p>
+            <a:p>
+              <a:pPr algn="ctr"/>
+              <a:r>
+                <a:rPr lang="en-GB" sz="1200" dirty="0" smtClean="0"/>
+                <a:t>Serves</a:t>
+              </a:r>
+            </a:p>
+            <a:p>
+              <a:pPr algn="ctr"/>
+              <a:r>
+                <a:rPr lang="en-GB" sz="1200" dirty="0" smtClean="0"/>
+                <a:t>Cooking  time</a:t>
+              </a:r>
+            </a:p>
+            <a:p>
+              <a:pPr algn="ctr"/>
+              <a:r>
+                <a:rPr lang="en-GB" sz="1200" dirty="0" smtClean="0"/>
+                <a:t>Date</a:t>
+              </a:r>
+            </a:p>
+            <a:p>
+              <a:pPr algn="ctr"/>
+              <a:r>
+                <a:rPr lang="en-GB" sz="1200" dirty="0" smtClean="0"/>
+                <a:t>Rating</a:t>
+              </a:r>
+            </a:p>
+            <a:p>
+              <a:pPr algn="ctr"/>
+              <a:r>
+                <a:rPr lang="en-GB" sz="1200" dirty="0" smtClean="0"/>
+                <a:t>Picture</a:t>
+              </a:r>
+            </a:p>
+            <a:p>
+              <a:pPr algn="ctr"/>
+              <a:r>
+                <a:rPr lang="en-GB" sz="1200" dirty="0" smtClean="0"/>
+                <a:t>Views</a:t>
+              </a:r>
+            </a:p>
+            <a:p>
+              <a:pPr algn="ctr"/>
+              <a:r>
+                <a:rPr lang="en-GB" sz="1200" dirty="0" err="1" smtClean="0"/>
+                <a:t>isVegetarian</a:t>
+              </a:r>
+              <a:endParaRPr lang="en-GB" sz="1200" dirty="0"/>
+            </a:p>
+            <a:p>
+              <a:pPr algn="ctr"/>
+              <a:r>
+                <a:rPr lang="en-GB" sz="1200" dirty="0" err="1" smtClean="0"/>
+                <a:t>isVegan</a:t>
+              </a:r>
+              <a:endParaRPr lang="en-GB" sz="1200" dirty="0" smtClean="0"/>
+            </a:p>
+            <a:p>
+              <a:pPr algn="ctr"/>
+              <a:r>
+                <a:rPr lang="en-GB" sz="1200" dirty="0" err="1" smtClean="0"/>
+                <a:t>isGF</a:t>
+              </a:r>
+              <a:endParaRPr lang="en-GB" sz="1200" dirty="0" smtClean="0"/>
+            </a:p>
+            <a:p>
+              <a:pPr algn="ctr"/>
+              <a:r>
+                <a:rPr lang="en-GB" sz="1200" dirty="0" err="1" smtClean="0"/>
+                <a:t>isDairyFree</a:t>
+              </a:r>
+              <a:endParaRPr lang="en-GB" sz="1200" dirty="0" smtClean="0"/>
+            </a:p>
+          </p:txBody>
+        </p:sp>
+        <p:cxnSp>
+          <p:nvCxnSpPr>
+            <p:cNvPr id="31" name="Straight Connector 30"/>
+            <p:cNvCxnSpPr>
+              <a:stCxn id="30" idx="2"/>
+              <a:endCxn id="7" idx="0"/>
+            </p:cNvCxnSpPr>
+            <p:nvPr/>
+          </p:nvCxnSpPr>
+          <p:spPr>
+            <a:xfrm>
+              <a:off x="1447800" y="2696284"/>
+              <a:ext cx="0" cy="199827"/>
+            </a:xfrm>
+            <a:prstGeom prst="line">
+              <a:avLst/>
+            </a:prstGeom>
+            <a:ln w="12700">
+              <a:solidFill>
                 <a:schemeClr val="tx1"/>
-              </a:fontRef>
-            </p:style>
-          </p:cxnSp>
-        </p:grpSp>
-        <p:grpSp>
-          <p:nvGrpSpPr>
-            <p:cNvPr id="29" name="Group 28"/>
-            <p:cNvGrpSpPr/>
+              </a:solidFill>
+            </a:ln>
+          </p:spPr>
+          <p:style>
+            <a:lnRef idx="1">
+              <a:schemeClr val="accent1"/>
+            </a:lnRef>
+            <a:fillRef idx="0">
+              <a:schemeClr val="accent1"/>
+            </a:fillRef>
+            <a:effectRef idx="0">
+              <a:schemeClr val="accent1"/>
+            </a:effectRef>
+            <a:fontRef idx="minor">
+              <a:schemeClr val="tx1"/>
+            </a:fontRef>
+          </p:style>
+        </p:cxnSp>
+      </p:grpSp>
+      <p:grpSp>
+        <p:nvGrpSpPr>
+          <p:cNvPr id="51" name="Group 50"/>
+          <p:cNvGrpSpPr/>
+          <p:nvPr/>
+        </p:nvGrpSpPr>
+        <p:grpSpPr>
+          <a:xfrm>
+            <a:off x="7175500" y="2755900"/>
+            <a:ext cx="1219200" cy="658211"/>
+            <a:chOff x="838200" y="3477030"/>
+            <a:chExt cx="1219200" cy="1002250"/>
+          </a:xfrm>
+        </p:grpSpPr>
+        <p:sp>
+          <p:nvSpPr>
+            <p:cNvPr id="52" name="TextBox 51"/>
+            <p:cNvSpPr txBox="1"/>
             <p:nvPr/>
-          </p:nvGrpSpPr>
-          <p:grpSpPr>
+          </p:nvSpPr>
+          <p:spPr>
             <a:xfrm>
-              <a:off x="3962400" y="152400"/>
-              <a:ext cx="1219200" cy="3282554"/>
-              <a:chOff x="838200" y="2065345"/>
-              <a:chExt cx="1219200" cy="830766"/>
+              <a:off x="838200" y="3477030"/>
+              <a:ext cx="1219200" cy="421783"/>
             </a:xfrm>
-          </p:grpSpPr>
-          <p:sp>
-            <p:nvSpPr>
-              <p:cNvPr id="30" name="TextBox 29"/>
-              <p:cNvSpPr txBox="1"/>
-              <p:nvPr/>
-            </p:nvSpPr>
-            <p:spPr>
-              <a:xfrm>
-                <a:off x="838200" y="2065345"/>
-                <a:ext cx="1219200" cy="677675"/>
-              </a:xfrm>
-              <a:prstGeom prst="rect">
-                <a:avLst/>
-              </a:prstGeom>
+            <a:prstGeom prst="rect">
+              <a:avLst/>
+            </a:prstGeom>
+            <a:solidFill>
+              <a:schemeClr val="accent3">
+                <a:lumMod val="60000"/>
+                <a:lumOff val="40000"/>
+              </a:schemeClr>
+            </a:solidFill>
+            <a:ln w="12700">
               <a:solidFill>
-                <a:schemeClr val="accent3">
-                  <a:lumMod val="60000"/>
-                  <a:lumOff val="40000"/>
-                </a:schemeClr>
+                <a:schemeClr val="tx1"/>
               </a:solidFill>
-              <a:ln w="12700">
-                <a:solidFill>
-                  <a:schemeClr val="tx1"/>
-                </a:solidFill>
-              </a:ln>
-            </p:spPr>
-            <p:txBody>
-              <a:bodyPr wrap="square" rtlCol="0">
-                <a:spAutoFit/>
-              </a:bodyPr>
-              <a:lstStyle/>
-              <a:p>
-                <a:pPr algn="ctr"/>
-                <a:r>
-                  <a:rPr lang="en-GB" sz="1200" u="sng" dirty="0" smtClean="0"/>
-                  <a:t>Name (PK)</a:t>
-                </a:r>
-              </a:p>
-              <a:p>
-                <a:pPr algn="ctr"/>
-                <a:r>
-                  <a:rPr lang="en-GB" sz="1200" u="sng" dirty="0" smtClean="0"/>
-                  <a:t>User(FK)</a:t>
-                </a:r>
-              </a:p>
-              <a:p>
-                <a:pPr algn="ctr"/>
-                <a:r>
-                  <a:rPr lang="en-GB" sz="1200" dirty="0" smtClean="0"/>
-                  <a:t>Ingredients</a:t>
-                </a:r>
-                <a:endParaRPr lang="en-GB" sz="1200" dirty="0"/>
-              </a:p>
-              <a:p>
-                <a:pPr algn="ctr"/>
-                <a:r>
-                  <a:rPr lang="en-GB" sz="1200" dirty="0" smtClean="0"/>
-                  <a:t>Serves</a:t>
-                </a:r>
-              </a:p>
-              <a:p>
-                <a:pPr algn="ctr"/>
-                <a:r>
-                  <a:rPr lang="en-GB" sz="1200" dirty="0" smtClean="0"/>
-                  <a:t>Cooking  time</a:t>
-                </a:r>
-              </a:p>
-              <a:p>
-                <a:pPr algn="ctr"/>
-                <a:r>
-                  <a:rPr lang="en-GB" sz="1200" dirty="0" smtClean="0"/>
-                  <a:t>Comments</a:t>
-                </a:r>
-              </a:p>
-              <a:p>
-                <a:pPr algn="ctr"/>
-                <a:r>
-                  <a:rPr lang="en-GB" sz="1200" dirty="0" smtClean="0"/>
-                  <a:t>Date</a:t>
-                </a:r>
-              </a:p>
-              <a:p>
-                <a:pPr algn="ctr"/>
-                <a:r>
-                  <a:rPr lang="en-GB" sz="1200" dirty="0" smtClean="0"/>
-                  <a:t>Rating</a:t>
-                </a:r>
-              </a:p>
-              <a:p>
-                <a:pPr algn="ctr"/>
-                <a:r>
-                  <a:rPr lang="en-GB" sz="1200" dirty="0" smtClean="0"/>
-                  <a:t>Picture</a:t>
-                </a:r>
-              </a:p>
-              <a:p>
-                <a:pPr algn="ctr"/>
-                <a:r>
-                  <a:rPr lang="en-GB" sz="1200" dirty="0" smtClean="0"/>
-                  <a:t>Views</a:t>
-                </a:r>
-              </a:p>
-              <a:p>
-                <a:pPr algn="ctr"/>
-                <a:r>
-                  <a:rPr lang="en-GB" sz="1200" dirty="0" err="1" smtClean="0"/>
-                  <a:t>isVegetarian</a:t>
-                </a:r>
-                <a:endParaRPr lang="en-GB" sz="1200" dirty="0"/>
-              </a:p>
-              <a:p>
-                <a:pPr algn="ctr"/>
-                <a:r>
-                  <a:rPr lang="en-GB" sz="1200" dirty="0" err="1" smtClean="0"/>
-                  <a:t>isVegan</a:t>
-                </a:r>
-                <a:endParaRPr lang="en-GB" sz="1200" dirty="0" smtClean="0"/>
-              </a:p>
-              <a:p>
-                <a:pPr algn="ctr"/>
-                <a:r>
-                  <a:rPr lang="en-GB" sz="1200" dirty="0" err="1" smtClean="0"/>
-                  <a:t>isGF</a:t>
-                </a:r>
-                <a:endParaRPr lang="en-GB" sz="1200" dirty="0" smtClean="0"/>
-              </a:p>
-              <a:p>
-                <a:pPr algn="ctr"/>
-                <a:r>
-                  <a:rPr lang="en-GB" sz="1200" dirty="0" err="1" smtClean="0"/>
-                  <a:t>isDairyFree</a:t>
-                </a:r>
-                <a:endParaRPr lang="en-GB" sz="1200" dirty="0" smtClean="0"/>
-              </a:p>
-            </p:txBody>
-          </p:sp>
-          <p:cxnSp>
-            <p:nvCxnSpPr>
-              <p:cNvPr id="31" name="Straight Connector 30"/>
-              <p:cNvCxnSpPr>
-                <a:stCxn id="30" idx="2"/>
-                <a:endCxn id="7" idx="0"/>
-              </p:cNvCxnSpPr>
-              <p:nvPr/>
-            </p:nvCxnSpPr>
-            <p:spPr>
-              <a:xfrm>
-                <a:off x="1447800" y="2743020"/>
-                <a:ext cx="0" cy="153091"/>
-              </a:xfrm>
-              <a:prstGeom prst="line">
-                <a:avLst/>
-              </a:prstGeom>
-              <a:ln w="12700">
-                <a:solidFill>
-                  <a:schemeClr val="tx1"/>
-                </a:solidFill>
-              </a:ln>
-            </p:spPr>
-            <p:style>
-              <a:lnRef idx="1">
-                <a:schemeClr val="accent1"/>
-              </a:lnRef>
-              <a:fillRef idx="0">
-                <a:schemeClr val="accent1"/>
-              </a:fillRef>
-              <a:effectRef idx="0">
-                <a:schemeClr val="accent1"/>
-              </a:effectRef>
-              <a:fontRef idx="minor">
+            </a:ln>
+          </p:spPr>
+          <p:txBody>
+            <a:bodyPr wrap="square" rtlCol="0">
+              <a:spAutoFit/>
+            </a:bodyPr>
+            <a:lstStyle/>
+            <a:p>
+              <a:pPr algn="ctr"/>
+              <a:r>
+                <a:rPr lang="en-GB" sz="1200" u="sng" dirty="0" smtClean="0"/>
+                <a:t>Name(PK</a:t>
+              </a:r>
+              <a:r>
+                <a:rPr lang="en-GB" sz="1200" b="1" u="sng" dirty="0" smtClean="0"/>
+                <a:t>)</a:t>
+              </a:r>
+            </a:p>
+          </p:txBody>
+        </p:sp>
+        <p:cxnSp>
+          <p:nvCxnSpPr>
+            <p:cNvPr id="53" name="Straight Connector 52"/>
+            <p:cNvCxnSpPr>
+              <a:stCxn id="8" idx="0"/>
+              <a:endCxn id="52" idx="2"/>
+            </p:cNvCxnSpPr>
+            <p:nvPr/>
+          </p:nvCxnSpPr>
+          <p:spPr>
+            <a:xfrm flipV="1">
+              <a:off x="1447800" y="3898813"/>
+              <a:ext cx="0" cy="580467"/>
+            </a:xfrm>
+            <a:prstGeom prst="line">
+              <a:avLst/>
+            </a:prstGeom>
+            <a:ln w="12700">
+              <a:solidFill>
                 <a:schemeClr val="tx1"/>
-              </a:fontRef>
-            </p:style>
-          </p:cxnSp>
-        </p:grpSp>
-        <p:grpSp>
-          <p:nvGrpSpPr>
-            <p:cNvPr id="46" name="Group 45"/>
-            <p:cNvGrpSpPr/>
-            <p:nvPr/>
-          </p:nvGrpSpPr>
-          <p:grpSpPr>
-            <a:xfrm>
-              <a:off x="6477000" y="1964093"/>
-              <a:ext cx="1219200" cy="547531"/>
-              <a:chOff x="838200" y="2065346"/>
-              <a:chExt cx="1219200" cy="824531"/>
-            </a:xfrm>
-          </p:grpSpPr>
-          <p:sp>
-            <p:nvSpPr>
-              <p:cNvPr id="47" name="TextBox 46"/>
-              <p:cNvSpPr txBox="1"/>
-              <p:nvPr/>
-            </p:nvSpPr>
-            <p:spPr>
-              <a:xfrm>
-                <a:off x="838200" y="2065346"/>
-                <a:ext cx="1219200" cy="417135"/>
-              </a:xfrm>
-              <a:prstGeom prst="rect">
-                <a:avLst/>
-              </a:prstGeom>
-              <a:solidFill>
-                <a:schemeClr val="accent3">
-                  <a:lumMod val="60000"/>
-                  <a:lumOff val="40000"/>
-                </a:schemeClr>
               </a:solidFill>
-              <a:ln w="12700">
-                <a:solidFill>
-                  <a:schemeClr val="tx1"/>
-                </a:solidFill>
-              </a:ln>
-            </p:spPr>
-            <p:txBody>
-              <a:bodyPr wrap="square" rtlCol="0">
-                <a:spAutoFit/>
-              </a:bodyPr>
-              <a:lstStyle/>
-              <a:p>
-                <a:pPr algn="ctr"/>
-                <a:r>
-                  <a:rPr lang="en-GB" sz="1200" u="sng" dirty="0" smtClean="0"/>
-                  <a:t>Name(PK</a:t>
-                </a:r>
-                <a:r>
-                  <a:rPr lang="en-GB" sz="1200" b="1" u="sng" dirty="0" smtClean="0"/>
-                  <a:t>)</a:t>
-                </a:r>
-              </a:p>
-            </p:txBody>
-          </p:sp>
-          <p:cxnSp>
-            <p:nvCxnSpPr>
-              <p:cNvPr id="48" name="Straight Connector 47"/>
-              <p:cNvCxnSpPr>
-                <a:stCxn id="9" idx="0"/>
-                <a:endCxn id="47" idx="2"/>
-              </p:cNvCxnSpPr>
-              <p:nvPr/>
-            </p:nvCxnSpPr>
-            <p:spPr>
-              <a:xfrm flipV="1">
-                <a:off x="1447800" y="2482481"/>
-                <a:ext cx="0" cy="407396"/>
-              </a:xfrm>
-              <a:prstGeom prst="line">
-                <a:avLst/>
-              </a:prstGeom>
-              <a:ln w="12700">
-                <a:solidFill>
-                  <a:schemeClr val="tx1"/>
-                </a:solidFill>
-              </a:ln>
-            </p:spPr>
-            <p:style>
-              <a:lnRef idx="1">
-                <a:schemeClr val="accent1"/>
-              </a:lnRef>
-              <a:fillRef idx="0">
-                <a:schemeClr val="accent1"/>
-              </a:fillRef>
-              <a:effectRef idx="0">
-                <a:schemeClr val="accent1"/>
-              </a:effectRef>
-              <a:fontRef idx="minor">
-                <a:schemeClr val="tx1"/>
-              </a:fontRef>
-            </p:style>
-          </p:cxnSp>
-        </p:grpSp>
-        <p:grpSp>
-          <p:nvGrpSpPr>
-            <p:cNvPr id="51" name="Group 50"/>
-            <p:cNvGrpSpPr/>
-            <p:nvPr/>
-          </p:nvGrpSpPr>
-          <p:grpSpPr>
-            <a:xfrm>
-              <a:off x="6477000" y="3828333"/>
-              <a:ext cx="1219200" cy="529950"/>
-              <a:chOff x="838200" y="2065346"/>
-              <a:chExt cx="1219200" cy="806949"/>
-            </a:xfrm>
-          </p:grpSpPr>
-          <p:sp>
-            <p:nvSpPr>
-              <p:cNvPr id="52" name="TextBox 51"/>
-              <p:cNvSpPr txBox="1"/>
-              <p:nvPr/>
-            </p:nvSpPr>
-            <p:spPr>
-              <a:xfrm>
-                <a:off x="838200" y="2065346"/>
-                <a:ext cx="1219200" cy="421783"/>
-              </a:xfrm>
-              <a:prstGeom prst="rect">
-                <a:avLst/>
-              </a:prstGeom>
-              <a:solidFill>
-                <a:schemeClr val="accent3">
-                  <a:lumMod val="60000"/>
-                  <a:lumOff val="40000"/>
-                </a:schemeClr>
-              </a:solidFill>
-              <a:ln w="12700">
-                <a:solidFill>
-                  <a:schemeClr val="tx1"/>
-                </a:solidFill>
-              </a:ln>
-            </p:spPr>
-            <p:txBody>
-              <a:bodyPr wrap="square" rtlCol="0">
-                <a:spAutoFit/>
-              </a:bodyPr>
-              <a:lstStyle/>
-              <a:p>
-                <a:pPr algn="ctr"/>
-                <a:r>
-                  <a:rPr lang="en-GB" sz="1200" u="sng" dirty="0" smtClean="0"/>
-                  <a:t>Name(PK</a:t>
-                </a:r>
-                <a:r>
-                  <a:rPr lang="en-GB" sz="1200" b="1" u="sng" dirty="0" smtClean="0"/>
-                  <a:t>)</a:t>
-                </a:r>
-              </a:p>
-            </p:txBody>
-          </p:sp>
-          <p:cxnSp>
-            <p:nvCxnSpPr>
-              <p:cNvPr id="53" name="Straight Connector 52"/>
-              <p:cNvCxnSpPr>
-                <a:stCxn id="8" idx="0"/>
-                <a:endCxn id="52" idx="2"/>
-              </p:cNvCxnSpPr>
-              <p:nvPr/>
-            </p:nvCxnSpPr>
-            <p:spPr>
-              <a:xfrm flipV="1">
-                <a:off x="1447800" y="2487129"/>
-                <a:ext cx="0" cy="385166"/>
-              </a:xfrm>
-              <a:prstGeom prst="line">
-                <a:avLst/>
-              </a:prstGeom>
-              <a:ln w="12700">
-                <a:solidFill>
-                  <a:schemeClr val="tx1"/>
-                </a:solidFill>
-              </a:ln>
-            </p:spPr>
-            <p:style>
-              <a:lnRef idx="1">
-                <a:schemeClr val="accent1"/>
-              </a:lnRef>
-              <a:fillRef idx="0">
-                <a:schemeClr val="accent1"/>
-              </a:fillRef>
-              <a:effectRef idx="0">
-                <a:schemeClr val="accent1"/>
-              </a:effectRef>
-              <a:fontRef idx="minor">
-                <a:schemeClr val="tx1"/>
-              </a:fontRef>
-            </p:style>
-          </p:cxnSp>
-        </p:grpSp>
+            </a:ln>
+          </p:spPr>
+          <p:style>
+            <a:lnRef idx="1">
+              <a:schemeClr val="accent1"/>
+            </a:lnRef>
+            <a:fillRef idx="0">
+              <a:schemeClr val="accent1"/>
+            </a:fillRef>
+            <a:effectRef idx="0">
+              <a:schemeClr val="accent1"/>
+            </a:effectRef>
+            <a:fontRef idx="minor">
+              <a:schemeClr val="tx1"/>
+            </a:fontRef>
+          </p:style>
+        </p:cxnSp>
       </p:grpSp>
       <p:sp>
         <p:nvSpPr>
@@ -4114,6 +3852,247 @@
           </a:p>
         </p:txBody>
       </p:sp>
+      <p:sp>
+        <p:nvSpPr>
+          <p:cNvPr id="75" name="TextBox 74"/>
+          <p:cNvSpPr txBox="1"/>
+          <p:nvPr/>
+        </p:nvSpPr>
+        <p:spPr>
+          <a:xfrm>
+            <a:off x="4419600" y="5093571"/>
+            <a:ext cx="1371600" cy="923330"/>
+          </a:xfrm>
+          <a:prstGeom prst="rect">
+            <a:avLst/>
+          </a:prstGeom>
+          <a:solidFill>
+            <a:srgbClr val="92D050"/>
+          </a:solidFill>
+          <a:ln w="25400">
+            <a:solidFill>
+              <a:schemeClr val="tx1"/>
+            </a:solidFill>
+          </a:ln>
+        </p:spPr>
+        <p:txBody>
+          <a:bodyPr wrap="square" rtlCol="0">
+            <a:spAutoFit/>
+          </a:bodyPr>
+          <a:lstStyle/>
+          <a:p>
+            <a:pPr algn="ctr"/>
+            <a:endParaRPr lang="en-GB" b="1" dirty="0" smtClean="0"/>
+          </a:p>
+          <a:p>
+            <a:pPr algn="ctr"/>
+            <a:r>
+              <a:rPr lang="en-GB" b="1" dirty="0" smtClean="0"/>
+              <a:t>Comment</a:t>
+            </a:r>
+          </a:p>
+          <a:p>
+            <a:endParaRPr lang="en-GB" b="1" dirty="0"/>
+          </a:p>
+        </p:txBody>
+      </p:sp>
+      <p:cxnSp>
+        <p:nvCxnSpPr>
+          <p:cNvPr id="76" name="Straight Connector 75"/>
+          <p:cNvCxnSpPr>
+            <a:stCxn id="7" idx="2"/>
+            <a:endCxn id="75" idx="0"/>
+          </p:cNvCxnSpPr>
+          <p:nvPr/>
+        </p:nvCxnSpPr>
+        <p:spPr>
+          <a:xfrm>
+            <a:off x="5105400" y="4338932"/>
+            <a:ext cx="0" cy="754639"/>
+          </a:xfrm>
+          <a:prstGeom prst="line">
+            <a:avLst/>
+          </a:prstGeom>
+          <a:ln w="25400">
+            <a:solidFill>
+              <a:schemeClr val="tx1"/>
+            </a:solidFill>
+          </a:ln>
+        </p:spPr>
+        <p:style>
+          <a:lnRef idx="1">
+            <a:schemeClr val="accent1"/>
+          </a:lnRef>
+          <a:fillRef idx="0">
+            <a:schemeClr val="accent1"/>
+          </a:fillRef>
+          <a:effectRef idx="0">
+            <a:schemeClr val="accent1"/>
+          </a:effectRef>
+          <a:fontRef idx="minor">
+            <a:schemeClr val="tx1"/>
+          </a:fontRef>
+        </p:style>
+      </p:cxnSp>
+      <p:sp>
+        <p:nvSpPr>
+          <p:cNvPr id="81" name="TextBox 80"/>
+          <p:cNvSpPr txBox="1"/>
+          <p:nvPr/>
+        </p:nvSpPr>
+        <p:spPr>
+          <a:xfrm>
+            <a:off x="4800600" y="4763725"/>
+            <a:ext cx="304800" cy="307777"/>
+          </a:xfrm>
+          <a:prstGeom prst="rect">
+            <a:avLst/>
+          </a:prstGeom>
+          <a:noFill/>
+        </p:spPr>
+        <p:txBody>
+          <a:bodyPr wrap="square" rtlCol="0">
+            <a:spAutoFit/>
+          </a:bodyPr>
+          <a:lstStyle/>
+          <a:p>
+            <a:r>
+              <a:rPr lang="en-GB" sz="1400" b="1" dirty="0"/>
+              <a:t>M</a:t>
+            </a:r>
+          </a:p>
+        </p:txBody>
+      </p:sp>
+      <p:sp>
+        <p:nvSpPr>
+          <p:cNvPr id="92" name="TextBox 91"/>
+          <p:cNvSpPr txBox="1"/>
+          <p:nvPr/>
+        </p:nvSpPr>
+        <p:spPr>
+          <a:xfrm>
+            <a:off x="6794500" y="3569490"/>
+            <a:ext cx="304800" cy="307777"/>
+          </a:xfrm>
+          <a:prstGeom prst="rect">
+            <a:avLst/>
+          </a:prstGeom>
+          <a:noFill/>
+        </p:spPr>
+        <p:txBody>
+          <a:bodyPr wrap="square" rtlCol="0">
+            <a:spAutoFit/>
+          </a:bodyPr>
+          <a:lstStyle/>
+          <a:p>
+            <a:r>
+              <a:rPr lang="en-GB" sz="1400" b="1" dirty="0" smtClean="0"/>
+              <a:t>1</a:t>
+            </a:r>
+            <a:endParaRPr lang="en-GB" sz="1400" b="1" dirty="0"/>
+          </a:p>
+        </p:txBody>
+      </p:sp>
+      <p:sp>
+        <p:nvSpPr>
+          <p:cNvPr id="94" name="TextBox 93"/>
+          <p:cNvSpPr txBox="1"/>
+          <p:nvPr/>
+        </p:nvSpPr>
+        <p:spPr>
+          <a:xfrm>
+            <a:off x="6502400" y="5139737"/>
+            <a:ext cx="1219200" cy="830997"/>
+          </a:xfrm>
+          <a:prstGeom prst="rect">
+            <a:avLst/>
+          </a:prstGeom>
+          <a:solidFill>
+            <a:schemeClr val="accent3">
+              <a:lumMod val="60000"/>
+              <a:lumOff val="40000"/>
+            </a:schemeClr>
+          </a:solidFill>
+          <a:ln w="12700">
+            <a:solidFill>
+              <a:schemeClr val="tx1"/>
+            </a:solidFill>
+          </a:ln>
+        </p:spPr>
+        <p:txBody>
+          <a:bodyPr wrap="square" rtlCol="0">
+            <a:spAutoFit/>
+          </a:bodyPr>
+          <a:lstStyle/>
+          <a:p>
+            <a:pPr algn="ctr"/>
+            <a:r>
+              <a:rPr lang="en-GB" sz="1200" u="sng" dirty="0" smtClean="0"/>
+              <a:t>User(FK)</a:t>
+            </a:r>
+          </a:p>
+          <a:p>
+            <a:pPr algn="ctr"/>
+            <a:r>
+              <a:rPr lang="en-GB" sz="1200" u="sng" dirty="0" smtClean="0"/>
+              <a:t>Recipe(FK)</a:t>
+            </a:r>
+          </a:p>
+          <a:p>
+            <a:pPr algn="ctr"/>
+            <a:r>
+              <a:rPr lang="en-GB" sz="1200" dirty="0" smtClean="0"/>
+              <a:t>Text</a:t>
+            </a:r>
+          </a:p>
+          <a:p>
+            <a:pPr algn="ctr"/>
+            <a:r>
+              <a:rPr lang="en-GB" sz="1200" smtClean="0"/>
+              <a:t>Date-time</a:t>
+            </a:r>
+            <a:endParaRPr lang="en-GB" sz="1200" dirty="0" smtClean="0"/>
+          </a:p>
+        </p:txBody>
+      </p:sp>
+      <p:cxnSp>
+        <p:nvCxnSpPr>
+          <p:cNvPr id="96" name="Straight Connector 95"/>
+          <p:cNvCxnSpPr>
+            <a:stCxn id="75" idx="3"/>
+            <a:endCxn id="94" idx="1"/>
+          </p:cNvCxnSpPr>
+          <p:nvPr/>
+        </p:nvCxnSpPr>
+        <p:spPr>
+          <a:xfrm>
+            <a:off x="5791200" y="5555236"/>
+            <a:ext cx="711200" cy="0"/>
+          </a:xfrm>
+          <a:prstGeom prst="line">
+            <a:avLst/>
+          </a:prstGeom>
+          <a:ln w="12700">
+            <a:solidFill>
+              <a:schemeClr val="tx1"/>
+            </a:solidFill>
+          </a:ln>
+        </p:spPr>
+        <p:style>
+          <a:lnRef idx="1">
+            <a:schemeClr val="accent1"/>
+          </a:lnRef>
+          <a:fillRef idx="0">
+            <a:schemeClr val="accent1"/>
+          </a:fillRef>
+          <a:effectRef idx="0">
+            <a:schemeClr val="accent1"/>
+          </a:effectRef>
+          <a:fontRef idx="minor">
+            <a:schemeClr val="tx1"/>
+          </a:fontRef>
+        </p:style>
+      </p:cxnSp>
     </p:spTree>
     <p:extLst>
       <p:ext uri="{BB962C8B-B14F-4D97-AF65-F5344CB8AC3E}">

</xml_diff>

<commit_message>
Added relationships to ER Diagram.
</commit_message>
<xml_diff>
--- a/ERdiagram.pptx
+++ b/ERdiagram.pptx
@@ -6,6 +6,7 @@
   </p:sldMasterIdLst>
   <p:sldIdLst>
     <p:sldId id="256" r:id="rId2"/>
+    <p:sldId id="258" r:id="rId3"/>
   </p:sldIdLst>
   <p:sldSz cx="9144000" cy="6858000" type="screen4x3"/>
   <p:notesSz cx="6858000" cy="9144000"/>
@@ -104,6 +105,22 @@
       </a:defRPr>
     </a:lvl9pPr>
   </p:defaultTextStyle>
+  <p:extLst>
+    <p:ext uri="{EFAFB233-063F-42B5-8137-9DF3F51BA10A}">
+      <p15:sldGuideLst xmlns:p15="http://schemas.microsoft.com/office/powerpoint/2012/main">
+        <p15:guide id="1" orient="horz" pos="2160">
+          <p15:clr>
+            <a:srgbClr val="A4A3A4"/>
+          </p15:clr>
+        </p15:guide>
+        <p15:guide id="2" pos="2880">
+          <p15:clr>
+            <a:srgbClr val="A4A3A4"/>
+          </p15:clr>
+        </p15:guide>
+      </p15:sldGuideLst>
+    </p:ext>
+  </p:extLst>
 </p:presentation>
 </file>
 
@@ -145,7 +162,7 @@
           <a:lstStyle/>
           <a:p>
             <a:r>
-              <a:rPr lang="en-US" smtClean="0"/>
+              <a:rPr lang="en-US"/>
               <a:t>Click to edit Master title style</a:t>
             </a:r>
             <a:endParaRPr lang="en-GB"/>
@@ -264,7 +281,7 @@
           </a:lstStyle>
           <a:p>
             <a:r>
-              <a:rPr lang="en-US" smtClean="0"/>
+              <a:rPr lang="en-US"/>
               <a:t>Click to edit Master subtitle style</a:t>
             </a:r>
             <a:endParaRPr lang="en-GB"/>
@@ -288,7 +305,7 @@
           <a:p>
             <a:fld id="{63167F76-22A0-48F3-8D30-B9FFC12D0B50}" type="datetimeFigureOut">
               <a:rPr lang="en-GB" smtClean="0"/>
-              <a:t>16/02/2017</a:t>
+              <a:t>22/02/2017</a:t>
             </a:fld>
             <a:endParaRPr lang="en-GB"/>
           </a:p>
@@ -382,7 +399,7 @@
           <a:lstStyle/>
           <a:p>
             <a:r>
-              <a:rPr lang="en-US" smtClean="0"/>
+              <a:rPr lang="en-US"/>
               <a:t>Click to edit Master title style</a:t>
             </a:r>
             <a:endParaRPr lang="en-GB"/>
@@ -406,35 +423,35 @@
           <a:p>
             <a:pPr lvl="0"/>
             <a:r>
-              <a:rPr lang="en-US" smtClean="0"/>
+              <a:rPr lang="en-US"/>
               <a:t>Click to edit Master text styles</a:t>
             </a:r>
           </a:p>
           <a:p>
             <a:pPr lvl="1"/>
             <a:r>
-              <a:rPr lang="en-US" smtClean="0"/>
+              <a:rPr lang="en-US"/>
               <a:t>Second level</a:t>
             </a:r>
           </a:p>
           <a:p>
             <a:pPr lvl="2"/>
             <a:r>
-              <a:rPr lang="en-US" smtClean="0"/>
+              <a:rPr lang="en-US"/>
               <a:t>Third level</a:t>
             </a:r>
           </a:p>
           <a:p>
             <a:pPr lvl="3"/>
             <a:r>
-              <a:rPr lang="en-US" smtClean="0"/>
+              <a:rPr lang="en-US"/>
               <a:t>Fourth level</a:t>
             </a:r>
           </a:p>
           <a:p>
             <a:pPr lvl="4"/>
             <a:r>
-              <a:rPr lang="en-US" smtClean="0"/>
+              <a:rPr lang="en-US"/>
               <a:t>Fifth level</a:t>
             </a:r>
             <a:endParaRPr lang="en-GB"/>
@@ -458,7 +475,7 @@
           <a:p>
             <a:fld id="{63167F76-22A0-48F3-8D30-B9FFC12D0B50}" type="datetimeFigureOut">
               <a:rPr lang="en-GB" smtClean="0"/>
-              <a:t>16/02/2017</a:t>
+              <a:t>22/02/2017</a:t>
             </a:fld>
             <a:endParaRPr lang="en-GB"/>
           </a:p>
@@ -557,7 +574,7 @@
           <a:lstStyle/>
           <a:p>
             <a:r>
-              <a:rPr lang="en-US" smtClean="0"/>
+              <a:rPr lang="en-US"/>
               <a:t>Click to edit Master title style</a:t>
             </a:r>
             <a:endParaRPr lang="en-GB"/>
@@ -586,35 +603,35 @@
           <a:p>
             <a:pPr lvl="0"/>
             <a:r>
-              <a:rPr lang="en-US" smtClean="0"/>
+              <a:rPr lang="en-US"/>
               <a:t>Click to edit Master text styles</a:t>
             </a:r>
           </a:p>
           <a:p>
             <a:pPr lvl="1"/>
             <a:r>
-              <a:rPr lang="en-US" smtClean="0"/>
+              <a:rPr lang="en-US"/>
               <a:t>Second level</a:t>
             </a:r>
           </a:p>
           <a:p>
             <a:pPr lvl="2"/>
             <a:r>
-              <a:rPr lang="en-US" smtClean="0"/>
+              <a:rPr lang="en-US"/>
               <a:t>Third level</a:t>
             </a:r>
           </a:p>
           <a:p>
             <a:pPr lvl="3"/>
             <a:r>
-              <a:rPr lang="en-US" smtClean="0"/>
+              <a:rPr lang="en-US"/>
               <a:t>Fourth level</a:t>
             </a:r>
           </a:p>
           <a:p>
             <a:pPr lvl="4"/>
             <a:r>
-              <a:rPr lang="en-US" smtClean="0"/>
+              <a:rPr lang="en-US"/>
               <a:t>Fifth level</a:t>
             </a:r>
             <a:endParaRPr lang="en-GB"/>
@@ -638,7 +655,7 @@
           <a:p>
             <a:fld id="{63167F76-22A0-48F3-8D30-B9FFC12D0B50}" type="datetimeFigureOut">
               <a:rPr lang="en-GB" smtClean="0"/>
-              <a:t>16/02/2017</a:t>
+              <a:t>22/02/2017</a:t>
             </a:fld>
             <a:endParaRPr lang="en-GB"/>
           </a:p>
@@ -732,7 +749,7 @@
           <a:lstStyle/>
           <a:p>
             <a:r>
-              <a:rPr lang="en-US" smtClean="0"/>
+              <a:rPr lang="en-US"/>
               <a:t>Click to edit Master title style</a:t>
             </a:r>
             <a:endParaRPr lang="en-GB"/>
@@ -756,35 +773,35 @@
           <a:p>
             <a:pPr lvl="0"/>
             <a:r>
-              <a:rPr lang="en-US" smtClean="0"/>
+              <a:rPr lang="en-US"/>
               <a:t>Click to edit Master text styles</a:t>
             </a:r>
           </a:p>
           <a:p>
             <a:pPr lvl="1"/>
             <a:r>
-              <a:rPr lang="en-US" smtClean="0"/>
+              <a:rPr lang="en-US"/>
               <a:t>Second level</a:t>
             </a:r>
           </a:p>
           <a:p>
             <a:pPr lvl="2"/>
             <a:r>
-              <a:rPr lang="en-US" smtClean="0"/>
+              <a:rPr lang="en-US"/>
               <a:t>Third level</a:t>
             </a:r>
           </a:p>
           <a:p>
             <a:pPr lvl="3"/>
             <a:r>
-              <a:rPr lang="en-US" smtClean="0"/>
+              <a:rPr lang="en-US"/>
               <a:t>Fourth level</a:t>
             </a:r>
           </a:p>
           <a:p>
             <a:pPr lvl="4"/>
             <a:r>
-              <a:rPr lang="en-US" smtClean="0"/>
+              <a:rPr lang="en-US"/>
               <a:t>Fifth level</a:t>
             </a:r>
             <a:endParaRPr lang="en-GB"/>
@@ -808,7 +825,7 @@
           <a:p>
             <a:fld id="{63167F76-22A0-48F3-8D30-B9FFC12D0B50}" type="datetimeFigureOut">
               <a:rPr lang="en-GB" smtClean="0"/>
-              <a:t>16/02/2017</a:t>
+              <a:t>22/02/2017</a:t>
             </a:fld>
             <a:endParaRPr lang="en-GB"/>
           </a:p>
@@ -911,7 +928,7 @@
           </a:lstStyle>
           <a:p>
             <a:r>
-              <a:rPr lang="en-US" smtClean="0"/>
+              <a:rPr lang="en-US"/>
               <a:t>Click to edit Master title style</a:t>
             </a:r>
             <a:endParaRPr lang="en-GB"/>
@@ -1031,7 +1048,7 @@
           <a:p>
             <a:pPr lvl="0"/>
             <a:r>
-              <a:rPr lang="en-US" smtClean="0"/>
+              <a:rPr lang="en-US"/>
               <a:t>Click to edit Master text styles</a:t>
             </a:r>
           </a:p>
@@ -1054,7 +1071,7 @@
           <a:p>
             <a:fld id="{63167F76-22A0-48F3-8D30-B9FFC12D0B50}" type="datetimeFigureOut">
               <a:rPr lang="en-GB" smtClean="0"/>
-              <a:t>16/02/2017</a:t>
+              <a:t>22/02/2017</a:t>
             </a:fld>
             <a:endParaRPr lang="en-GB"/>
           </a:p>
@@ -1148,7 +1165,7 @@
           <a:lstStyle/>
           <a:p>
             <a:r>
-              <a:rPr lang="en-US" smtClean="0"/>
+              <a:rPr lang="en-US"/>
               <a:t>Click to edit Master title style</a:t>
             </a:r>
             <a:endParaRPr lang="en-GB"/>
@@ -1205,35 +1222,35 @@
           <a:p>
             <a:pPr lvl="0"/>
             <a:r>
-              <a:rPr lang="en-US" smtClean="0"/>
+              <a:rPr lang="en-US"/>
               <a:t>Click to edit Master text styles</a:t>
             </a:r>
           </a:p>
           <a:p>
             <a:pPr lvl="1"/>
             <a:r>
-              <a:rPr lang="en-US" smtClean="0"/>
+              <a:rPr lang="en-US"/>
               <a:t>Second level</a:t>
             </a:r>
           </a:p>
           <a:p>
             <a:pPr lvl="2"/>
             <a:r>
-              <a:rPr lang="en-US" smtClean="0"/>
+              <a:rPr lang="en-US"/>
               <a:t>Third level</a:t>
             </a:r>
           </a:p>
           <a:p>
             <a:pPr lvl="3"/>
             <a:r>
-              <a:rPr lang="en-US" smtClean="0"/>
+              <a:rPr lang="en-US"/>
               <a:t>Fourth level</a:t>
             </a:r>
           </a:p>
           <a:p>
             <a:pPr lvl="4"/>
             <a:r>
-              <a:rPr lang="en-US" smtClean="0"/>
+              <a:rPr lang="en-US"/>
               <a:t>Fifth level</a:t>
             </a:r>
             <a:endParaRPr lang="en-GB"/>
@@ -1290,35 +1307,35 @@
           <a:p>
             <a:pPr lvl="0"/>
             <a:r>
-              <a:rPr lang="en-US" smtClean="0"/>
+              <a:rPr lang="en-US"/>
               <a:t>Click to edit Master text styles</a:t>
             </a:r>
           </a:p>
           <a:p>
             <a:pPr lvl="1"/>
             <a:r>
-              <a:rPr lang="en-US" smtClean="0"/>
+              <a:rPr lang="en-US"/>
               <a:t>Second level</a:t>
             </a:r>
           </a:p>
           <a:p>
             <a:pPr lvl="2"/>
             <a:r>
-              <a:rPr lang="en-US" smtClean="0"/>
+              <a:rPr lang="en-US"/>
               <a:t>Third level</a:t>
             </a:r>
           </a:p>
           <a:p>
             <a:pPr lvl="3"/>
             <a:r>
-              <a:rPr lang="en-US" smtClean="0"/>
+              <a:rPr lang="en-US"/>
               <a:t>Fourth level</a:t>
             </a:r>
           </a:p>
           <a:p>
             <a:pPr lvl="4"/>
             <a:r>
-              <a:rPr lang="en-US" smtClean="0"/>
+              <a:rPr lang="en-US"/>
               <a:t>Fifth level</a:t>
             </a:r>
             <a:endParaRPr lang="en-GB"/>
@@ -1342,7 +1359,7 @@
           <a:p>
             <a:fld id="{63167F76-22A0-48F3-8D30-B9FFC12D0B50}" type="datetimeFigureOut">
               <a:rPr lang="en-GB" smtClean="0"/>
-              <a:t>16/02/2017</a:t>
+              <a:t>22/02/2017</a:t>
             </a:fld>
             <a:endParaRPr lang="en-GB"/>
           </a:p>
@@ -1440,7 +1457,7 @@
           </a:lstStyle>
           <a:p>
             <a:r>
-              <a:rPr lang="en-US" smtClean="0"/>
+              <a:rPr lang="en-US"/>
               <a:t>Click to edit Master title style</a:t>
             </a:r>
             <a:endParaRPr lang="en-GB"/>
@@ -1506,7 +1523,7 @@
           <a:p>
             <a:pPr lvl="0"/>
             <a:r>
-              <a:rPr lang="en-US" smtClean="0"/>
+              <a:rPr lang="en-US"/>
               <a:t>Click to edit Master text styles</a:t>
             </a:r>
           </a:p>
@@ -1562,35 +1579,35 @@
           <a:p>
             <a:pPr lvl="0"/>
             <a:r>
-              <a:rPr lang="en-US" smtClean="0"/>
+              <a:rPr lang="en-US"/>
               <a:t>Click to edit Master text styles</a:t>
             </a:r>
           </a:p>
           <a:p>
             <a:pPr lvl="1"/>
             <a:r>
-              <a:rPr lang="en-US" smtClean="0"/>
+              <a:rPr lang="en-US"/>
               <a:t>Second level</a:t>
             </a:r>
           </a:p>
           <a:p>
             <a:pPr lvl="2"/>
             <a:r>
-              <a:rPr lang="en-US" smtClean="0"/>
+              <a:rPr lang="en-US"/>
               <a:t>Third level</a:t>
             </a:r>
           </a:p>
           <a:p>
             <a:pPr lvl="3"/>
             <a:r>
-              <a:rPr lang="en-US" smtClean="0"/>
+              <a:rPr lang="en-US"/>
               <a:t>Fourth level</a:t>
             </a:r>
           </a:p>
           <a:p>
             <a:pPr lvl="4"/>
             <a:r>
-              <a:rPr lang="en-US" smtClean="0"/>
+              <a:rPr lang="en-US"/>
               <a:t>Fifth level</a:t>
             </a:r>
             <a:endParaRPr lang="en-GB"/>
@@ -1656,7 +1673,7 @@
           <a:p>
             <a:pPr lvl="0"/>
             <a:r>
-              <a:rPr lang="en-US" smtClean="0"/>
+              <a:rPr lang="en-US"/>
               <a:t>Click to edit Master text styles</a:t>
             </a:r>
           </a:p>
@@ -1712,35 +1729,35 @@
           <a:p>
             <a:pPr lvl="0"/>
             <a:r>
-              <a:rPr lang="en-US" smtClean="0"/>
+              <a:rPr lang="en-US"/>
               <a:t>Click to edit Master text styles</a:t>
             </a:r>
           </a:p>
           <a:p>
             <a:pPr lvl="1"/>
             <a:r>
-              <a:rPr lang="en-US" smtClean="0"/>
+              <a:rPr lang="en-US"/>
               <a:t>Second level</a:t>
             </a:r>
           </a:p>
           <a:p>
             <a:pPr lvl="2"/>
             <a:r>
-              <a:rPr lang="en-US" smtClean="0"/>
+              <a:rPr lang="en-US"/>
               <a:t>Third level</a:t>
             </a:r>
           </a:p>
           <a:p>
             <a:pPr lvl="3"/>
             <a:r>
-              <a:rPr lang="en-US" smtClean="0"/>
+              <a:rPr lang="en-US"/>
               <a:t>Fourth level</a:t>
             </a:r>
           </a:p>
           <a:p>
             <a:pPr lvl="4"/>
             <a:r>
-              <a:rPr lang="en-US" smtClean="0"/>
+              <a:rPr lang="en-US"/>
               <a:t>Fifth level</a:t>
             </a:r>
             <a:endParaRPr lang="en-GB"/>
@@ -1764,7 +1781,7 @@
           <a:p>
             <a:fld id="{63167F76-22A0-48F3-8D30-B9FFC12D0B50}" type="datetimeFigureOut">
               <a:rPr lang="en-GB" smtClean="0"/>
-              <a:t>16/02/2017</a:t>
+              <a:t>22/02/2017</a:t>
             </a:fld>
             <a:endParaRPr lang="en-GB"/>
           </a:p>
@@ -1858,7 +1875,7 @@
           <a:lstStyle/>
           <a:p>
             <a:r>
-              <a:rPr lang="en-US" smtClean="0"/>
+              <a:rPr lang="en-US"/>
               <a:t>Click to edit Master title style</a:t>
             </a:r>
             <a:endParaRPr lang="en-GB"/>
@@ -1882,7 +1899,7 @@
           <a:p>
             <a:fld id="{63167F76-22A0-48F3-8D30-B9FFC12D0B50}" type="datetimeFigureOut">
               <a:rPr lang="en-GB" smtClean="0"/>
-              <a:t>16/02/2017</a:t>
+              <a:t>22/02/2017</a:t>
             </a:fld>
             <a:endParaRPr lang="en-GB"/>
           </a:p>
@@ -1977,7 +1994,7 @@
           <a:p>
             <a:fld id="{63167F76-22A0-48F3-8D30-B9FFC12D0B50}" type="datetimeFigureOut">
               <a:rPr lang="en-GB" smtClean="0"/>
-              <a:t>16/02/2017</a:t>
+              <a:t>22/02/2017</a:t>
             </a:fld>
             <a:endParaRPr lang="en-GB"/>
           </a:p>
@@ -2080,7 +2097,7 @@
           </a:lstStyle>
           <a:p>
             <a:r>
-              <a:rPr lang="en-US" smtClean="0"/>
+              <a:rPr lang="en-US"/>
               <a:t>Click to edit Master title style</a:t>
             </a:r>
             <a:endParaRPr lang="en-GB"/>
@@ -2137,35 +2154,35 @@
           <a:p>
             <a:pPr lvl="0"/>
             <a:r>
-              <a:rPr lang="en-US" smtClean="0"/>
+              <a:rPr lang="en-US"/>
               <a:t>Click to edit Master text styles</a:t>
             </a:r>
           </a:p>
           <a:p>
             <a:pPr lvl="1"/>
             <a:r>
-              <a:rPr lang="en-US" smtClean="0"/>
+              <a:rPr lang="en-US"/>
               <a:t>Second level</a:t>
             </a:r>
           </a:p>
           <a:p>
             <a:pPr lvl="2"/>
             <a:r>
-              <a:rPr lang="en-US" smtClean="0"/>
+              <a:rPr lang="en-US"/>
               <a:t>Third level</a:t>
             </a:r>
           </a:p>
           <a:p>
             <a:pPr lvl="3"/>
             <a:r>
-              <a:rPr lang="en-US" smtClean="0"/>
+              <a:rPr lang="en-US"/>
               <a:t>Fourth level</a:t>
             </a:r>
           </a:p>
           <a:p>
             <a:pPr lvl="4"/>
             <a:r>
-              <a:rPr lang="en-US" smtClean="0"/>
+              <a:rPr lang="en-US"/>
               <a:t>Fifth level</a:t>
             </a:r>
             <a:endParaRPr lang="en-GB"/>
@@ -2231,7 +2248,7 @@
           <a:p>
             <a:pPr lvl="0"/>
             <a:r>
-              <a:rPr lang="en-US" smtClean="0"/>
+              <a:rPr lang="en-US"/>
               <a:t>Click to edit Master text styles</a:t>
             </a:r>
           </a:p>
@@ -2254,7 +2271,7 @@
           <a:p>
             <a:fld id="{63167F76-22A0-48F3-8D30-B9FFC12D0B50}" type="datetimeFigureOut">
               <a:rPr lang="en-GB" smtClean="0"/>
-              <a:t>16/02/2017</a:t>
+              <a:t>22/02/2017</a:t>
             </a:fld>
             <a:endParaRPr lang="en-GB"/>
           </a:p>
@@ -2357,7 +2374,7 @@
           </a:lstStyle>
           <a:p>
             <a:r>
-              <a:rPr lang="en-US" smtClean="0"/>
+              <a:rPr lang="en-US"/>
               <a:t>Click to edit Master title style</a:t>
             </a:r>
             <a:endParaRPr lang="en-GB"/>
@@ -2484,7 +2501,7 @@
           <a:p>
             <a:pPr lvl="0"/>
             <a:r>
-              <a:rPr lang="en-US" smtClean="0"/>
+              <a:rPr lang="en-US"/>
               <a:t>Click to edit Master text styles</a:t>
             </a:r>
           </a:p>
@@ -2507,7 +2524,7 @@
           <a:p>
             <a:fld id="{63167F76-22A0-48F3-8D30-B9FFC12D0B50}" type="datetimeFigureOut">
               <a:rPr lang="en-GB" smtClean="0"/>
-              <a:t>16/02/2017</a:t>
+              <a:t>22/02/2017</a:t>
             </a:fld>
             <a:endParaRPr lang="en-GB"/>
           </a:p>
@@ -2616,7 +2633,7 @@
           <a:lstStyle/>
           <a:p>
             <a:r>
-              <a:rPr lang="en-US" smtClean="0"/>
+              <a:rPr lang="en-US"/>
               <a:t>Click to edit Master title style</a:t>
             </a:r>
             <a:endParaRPr lang="en-GB"/>
@@ -2650,35 +2667,35 @@
           <a:p>
             <a:pPr lvl="0"/>
             <a:r>
-              <a:rPr lang="en-US" smtClean="0"/>
+              <a:rPr lang="en-US"/>
               <a:t>Click to edit Master text styles</a:t>
             </a:r>
           </a:p>
           <a:p>
             <a:pPr lvl="1"/>
             <a:r>
-              <a:rPr lang="en-US" smtClean="0"/>
+              <a:rPr lang="en-US"/>
               <a:t>Second level</a:t>
             </a:r>
           </a:p>
           <a:p>
             <a:pPr lvl="2"/>
             <a:r>
-              <a:rPr lang="en-US" smtClean="0"/>
+              <a:rPr lang="en-US"/>
               <a:t>Third level</a:t>
             </a:r>
           </a:p>
           <a:p>
             <a:pPr lvl="3"/>
             <a:r>
-              <a:rPr lang="en-US" smtClean="0"/>
+              <a:rPr lang="en-US"/>
               <a:t>Fourth level</a:t>
             </a:r>
           </a:p>
           <a:p>
             <a:pPr lvl="4"/>
             <a:r>
-              <a:rPr lang="en-US" smtClean="0"/>
+              <a:rPr lang="en-US"/>
               <a:t>Fifth level</a:t>
             </a:r>
             <a:endParaRPr lang="en-GB"/>
@@ -2720,7 +2737,7 @@
           <a:p>
             <a:fld id="{63167F76-22A0-48F3-8D30-B9FFC12D0B50}" type="datetimeFigureOut">
               <a:rPr lang="en-GB" smtClean="0"/>
-              <a:t>16/02/2017</a:t>
+              <a:t>22/02/2017</a:t>
             </a:fld>
             <a:endParaRPr lang="en-GB"/>
           </a:p>
@@ -3139,12 +3156,12 @@
             <a:lstStyle/>
             <a:p>
               <a:pPr algn="ctr"/>
-              <a:endParaRPr lang="en-GB" b="1" dirty="0" smtClean="0"/>
+              <a:endParaRPr lang="en-GB" b="1" dirty="0"/>
             </a:p>
             <a:p>
               <a:pPr algn="ctr"/>
               <a:r>
-                <a:rPr lang="en-GB" b="1" dirty="0" smtClean="0"/>
+                <a:rPr lang="en-GB" b="1" dirty="0"/>
                 <a:t>User</a:t>
               </a:r>
             </a:p>
@@ -3183,12 +3200,12 @@
             <a:lstStyle/>
             <a:p>
               <a:pPr algn="ctr"/>
-              <a:endParaRPr lang="en-GB" b="1" dirty="0" smtClean="0"/>
+              <a:endParaRPr lang="en-GB" b="1" dirty="0"/>
             </a:p>
             <a:p>
               <a:pPr algn="ctr"/>
               <a:r>
-                <a:rPr lang="en-GB" b="1" dirty="0" smtClean="0"/>
+                <a:rPr lang="en-GB" b="1" dirty="0"/>
                 <a:t>Recipe</a:t>
               </a:r>
             </a:p>
@@ -3227,12 +3244,12 @@
             <a:lstStyle/>
             <a:p>
               <a:pPr algn="ctr"/>
-              <a:endParaRPr lang="en-GB" b="1" dirty="0" smtClean="0"/>
+              <a:endParaRPr lang="en-GB" b="1" dirty="0"/>
             </a:p>
             <a:p>
               <a:pPr algn="ctr"/>
               <a:r>
-                <a:rPr lang="en-GB" b="1" dirty="0" smtClean="0"/>
+                <a:rPr lang="en-GB" b="1" dirty="0"/>
                 <a:t>Category</a:t>
               </a:r>
             </a:p>
@@ -3369,10 +3386,9 @@
             <a:lstStyle/>
             <a:p>
               <a:r>
-                <a:rPr lang="en-GB" sz="1400" b="1" dirty="0" smtClean="0"/>
+                <a:rPr lang="en-GB" sz="1400" b="1" dirty="0"/>
                 <a:t>1</a:t>
               </a:r>
-              <a:endParaRPr lang="en-GB" sz="1400" b="1" dirty="0"/>
             </a:p>
           </p:txBody>
         </p:sp>
@@ -3428,10 +3444,9 @@
             <a:lstStyle/>
             <a:p>
               <a:r>
-                <a:rPr lang="en-GB" sz="1400" b="1" dirty="0" smtClean="0"/>
+                <a:rPr lang="en-GB" sz="1400" b="1" dirty="0"/>
                 <a:t>1</a:t>
               </a:r>
-              <a:endParaRPr lang="en-GB" sz="1400" b="1" dirty="0"/>
             </a:p>
           </p:txBody>
         </p:sp>
@@ -3484,21 +3499,21 @@
             <a:p>
               <a:pPr algn="ctr"/>
               <a:r>
-                <a:rPr lang="en-GB" sz="1200" u="sng" dirty="0" smtClean="0"/>
+                <a:rPr lang="en-GB" sz="1200" u="sng" dirty="0"/>
                 <a:t>Username (PK)</a:t>
               </a:r>
             </a:p>
             <a:p>
               <a:pPr algn="ctr"/>
               <a:r>
-                <a:rPr lang="en-GB" sz="1200" dirty="0" smtClean="0"/>
+                <a:rPr lang="en-GB" sz="1200" dirty="0"/>
                 <a:t>Email Address</a:t>
               </a:r>
             </a:p>
             <a:p>
               <a:pPr algn="ctr"/>
               <a:r>
-                <a:rPr lang="en-GB" sz="1200" dirty="0" smtClean="0"/>
+                <a:rPr lang="en-GB" sz="1200" dirty="0"/>
                 <a:t>Password</a:t>
               </a:r>
             </a:p>
@@ -3591,71 +3606,70 @@
             <a:p>
               <a:pPr algn="ctr"/>
               <a:r>
-                <a:rPr lang="en-GB" sz="1200" u="sng" dirty="0" smtClean="0"/>
+                <a:rPr lang="en-GB" sz="1200" u="sng" dirty="0"/>
                 <a:t>Name (PK)</a:t>
               </a:r>
             </a:p>
             <a:p>
               <a:pPr algn="ctr"/>
               <a:r>
-                <a:rPr lang="en-GB" sz="1200" u="sng" dirty="0" smtClean="0"/>
+                <a:rPr lang="en-GB" sz="1200" u="sng" dirty="0"/>
                 <a:t>User(FK)</a:t>
               </a:r>
             </a:p>
             <a:p>
               <a:pPr algn="ctr"/>
               <a:r>
-                <a:rPr lang="en-GB" sz="1200" dirty="0" smtClean="0"/>
+                <a:rPr lang="en-GB" sz="1200" dirty="0"/>
                 <a:t>Ingredients</a:t>
               </a:r>
-              <a:endParaRPr lang="en-GB" sz="1200" dirty="0"/>
             </a:p>
             <a:p>
               <a:pPr algn="ctr"/>
               <a:r>
-                <a:rPr lang="en-GB" sz="1200" dirty="0" smtClean="0"/>
+                <a:rPr lang="en-GB" sz="1200" dirty="0"/>
                 <a:t>Serves</a:t>
               </a:r>
             </a:p>
             <a:p>
               <a:pPr algn="ctr"/>
               <a:r>
-                <a:rPr lang="en-GB" sz="1200" dirty="0" smtClean="0"/>
+                <a:rPr lang="en-GB" sz="1200" dirty="0"/>
                 <a:t>Cooking  time</a:t>
               </a:r>
             </a:p>
             <a:p>
               <a:pPr algn="ctr"/>
               <a:r>
-                <a:rPr lang="en-GB" sz="1200" dirty="0" smtClean="0"/>
+                <a:rPr lang="en-GB" sz="1200" dirty="0"/>
                 <a:t>Date</a:t>
               </a:r>
             </a:p>
             <a:p>
               <a:pPr algn="ctr"/>
               <a:r>
-                <a:rPr lang="en-GB" sz="1200" dirty="0" smtClean="0"/>
+                <a:rPr lang="en-GB" sz="1200" dirty="0"/>
                 <a:t>Rating</a:t>
               </a:r>
             </a:p>
             <a:p>
               <a:pPr algn="ctr"/>
               <a:r>
-                <a:rPr lang="en-GB" sz="1200" dirty="0" smtClean="0"/>
+                <a:rPr lang="en-GB" sz="1200" dirty="0"/>
                 <a:t>Picture</a:t>
               </a:r>
             </a:p>
             <a:p>
               <a:pPr algn="ctr"/>
               <a:r>
-                <a:rPr lang="en-GB" sz="1200" dirty="0" smtClean="0"/>
+                <a:rPr lang="en-GB" sz="1200" dirty="0"/>
                 <a:t>Views</a:t>
               </a:r>
             </a:p>
             <a:p>
               <a:pPr algn="ctr"/>
               <a:r>
-                <a:rPr lang="en-GB" sz="1200" dirty="0" err="1" smtClean="0"/>
+                <a:rPr lang="en-GB" sz="1200" dirty="0" err="1"/>
                 <a:t>isVegetarian</a:t>
               </a:r>
               <a:endParaRPr lang="en-GB" sz="1200" dirty="0"/>
@@ -3663,26 +3677,26 @@
             <a:p>
               <a:pPr algn="ctr"/>
               <a:r>
-                <a:rPr lang="en-GB" sz="1200" dirty="0" err="1" smtClean="0"/>
+                <a:rPr lang="en-GB" sz="1200" dirty="0" err="1"/>
                 <a:t>isVegan</a:t>
               </a:r>
-              <a:endParaRPr lang="en-GB" sz="1200" dirty="0" smtClean="0"/>
+              <a:endParaRPr lang="en-GB" sz="1200" dirty="0"/>
             </a:p>
             <a:p>
               <a:pPr algn="ctr"/>
               <a:r>
-                <a:rPr lang="en-GB" sz="1200" dirty="0" err="1" smtClean="0"/>
+                <a:rPr lang="en-GB" sz="1200" dirty="0" err="1"/>
                 <a:t>isGF</a:t>
               </a:r>
-              <a:endParaRPr lang="en-GB" sz="1200" dirty="0" smtClean="0"/>
+              <a:endParaRPr lang="en-GB" sz="1200" dirty="0"/>
             </a:p>
             <a:p>
               <a:pPr algn="ctr"/>
               <a:r>
-                <a:rPr lang="en-GB" sz="1200" dirty="0" err="1" smtClean="0"/>
+                <a:rPr lang="en-GB" sz="1200" dirty="0" err="1"/>
                 <a:t>isDairyFree</a:t>
               </a:r>
-              <a:endParaRPr lang="en-GB" sz="1200" dirty="0" smtClean="0"/>
+              <a:endParaRPr lang="en-GB" sz="1200" dirty="0"/>
             </a:p>
           </p:txBody>
         </p:sp>
@@ -3773,11 +3787,11 @@
             <a:p>
               <a:pPr algn="ctr"/>
               <a:r>
-                <a:rPr lang="en-GB" sz="1200" u="sng" dirty="0" smtClean="0"/>
+                <a:rPr lang="en-GB" sz="1200" u="sng" dirty="0"/>
                 <a:t>Name(PK</a:t>
               </a:r>
               <a:r>
-                <a:rPr lang="en-GB" sz="1200" b="1" u="sng" dirty="0" smtClean="0"/>
+                <a:rPr lang="en-GB" sz="1200" b="1" u="sng" dirty="0"/>
                 <a:t>)</a:t>
               </a:r>
             </a:p>
@@ -3845,10 +3859,9 @@
           <a:lstStyle/>
           <a:p>
             <a:r>
-              <a:rPr lang="en-GB" sz="3200" b="1" dirty="0" smtClean="0"/>
+              <a:rPr lang="en-GB" sz="3200" b="1" dirty="0"/>
               <a:t>ER Diagram</a:t>
             </a:r>
-            <a:endParaRPr lang="en-GB" sz="3200" b="1" dirty="0"/>
           </a:p>
         </p:txBody>
       </p:sp>
@@ -3882,12 +3895,12 @@
           <a:lstStyle/>
           <a:p>
             <a:pPr algn="ctr"/>
-            <a:endParaRPr lang="en-GB" b="1" dirty="0" smtClean="0"/>
+            <a:endParaRPr lang="en-GB" b="1" dirty="0"/>
           </a:p>
           <a:p>
             <a:pPr algn="ctr"/>
             <a:r>
-              <a:rPr lang="en-GB" b="1" dirty="0" smtClean="0"/>
+              <a:rPr lang="en-GB" b="1" dirty="0"/>
               <a:t>Comment</a:t>
             </a:r>
           </a:p>
@@ -3986,10 +3999,9 @@
           <a:lstStyle/>
           <a:p>
             <a:r>
-              <a:rPr lang="en-GB" sz="1400" b="1" dirty="0" smtClean="0"/>
+              <a:rPr lang="en-GB" sz="1400" b="1" dirty="0"/>
               <a:t>1</a:t>
             </a:r>
-            <a:endParaRPr lang="en-GB" sz="1400" b="1" dirty="0"/>
           </a:p>
         </p:txBody>
       </p:sp>
@@ -4027,31 +4039,31 @@
           <a:p>
             <a:pPr algn="ctr"/>
             <a:r>
-              <a:rPr lang="en-GB" sz="1200" u="sng" dirty="0" smtClean="0"/>
+              <a:rPr lang="en-GB" sz="1200" u="sng" dirty="0"/>
               <a:t>User(FK)</a:t>
             </a:r>
           </a:p>
           <a:p>
             <a:pPr algn="ctr"/>
             <a:r>
-              <a:rPr lang="en-GB" sz="1200" u="sng" dirty="0" smtClean="0"/>
+              <a:rPr lang="en-GB" sz="1200" u="sng" dirty="0"/>
               <a:t>Recipe(FK)</a:t>
             </a:r>
           </a:p>
           <a:p>
             <a:pPr algn="ctr"/>
             <a:r>
-              <a:rPr lang="en-GB" sz="1200" dirty="0" smtClean="0"/>
+              <a:rPr lang="en-GB" sz="1200" dirty="0"/>
               <a:t>Text</a:t>
             </a:r>
           </a:p>
           <a:p>
             <a:pPr algn="ctr"/>
             <a:r>
-              <a:rPr lang="en-GB" sz="1200" smtClean="0"/>
+              <a:rPr lang="en-GB" sz="1200"/>
               <a:t>Date-time</a:t>
             </a:r>
-            <a:endParaRPr lang="en-GB" sz="1200" dirty="0" smtClean="0"/>
+            <a:endParaRPr lang="en-GB" sz="1200" dirty="0"/>
           </a:p>
         </p:txBody>
       </p:sp>
@@ -4097,6 +4109,1588 @@
     <p:extLst>
       <p:ext uri="{BB962C8B-B14F-4D97-AF65-F5344CB8AC3E}">
         <p14:creationId xmlns:p14="http://schemas.microsoft.com/office/powerpoint/2010/main" val="3111670022"/>
+      </p:ext>
+    </p:extLst>
+  </p:cSld>
+  <p:clrMapOvr>
+    <a:masterClrMapping/>
+  </p:clrMapOvr>
+</p:sld>
+</file>
+
+<file path=ppt/slides/slide2.xml><?xml version="1.0" encoding="utf-8"?>
+<p:sld xmlns:a="http://schemas.openxmlformats.org/drawingml/2006/main" xmlns:r="http://schemas.openxmlformats.org/officeDocument/2006/relationships" xmlns:p="http://schemas.openxmlformats.org/presentationml/2006/main">
+  <p:cSld>
+    <p:spTree>
+      <p:nvGrpSpPr>
+        <p:cNvPr id="1" name=""/>
+        <p:cNvGrpSpPr/>
+        <p:nvPr/>
+      </p:nvGrpSpPr>
+      <p:grpSpPr>
+        <a:xfrm>
+          <a:off x="0" y="0"/>
+          <a:ext cx="0" cy="0"/>
+          <a:chOff x="0" y="0"/>
+          <a:chExt cx="0" cy="0"/>
+        </a:xfrm>
+      </p:grpSpPr>
+      <p:grpSp>
+        <p:nvGrpSpPr>
+          <p:cNvPr id="32" name="Group 31"/>
+          <p:cNvGrpSpPr/>
+          <p:nvPr/>
+        </p:nvGrpSpPr>
+        <p:grpSpPr>
+          <a:xfrm>
+            <a:off x="716350" y="3414111"/>
+            <a:ext cx="7754550" cy="2141049"/>
+            <a:chOff x="-198050" y="2817909"/>
+            <a:chExt cx="7754550" cy="2141049"/>
+          </a:xfrm>
+        </p:grpSpPr>
+        <p:sp>
+          <p:nvSpPr>
+            <p:cNvPr id="6" name="TextBox 5"/>
+            <p:cNvSpPr txBox="1"/>
+            <p:nvPr/>
+          </p:nvSpPr>
+          <p:spPr>
+            <a:xfrm>
+              <a:off x="-198050" y="2817909"/>
+              <a:ext cx="1371600" cy="923330"/>
+            </a:xfrm>
+            <a:prstGeom prst="rect">
+              <a:avLst/>
+            </a:prstGeom>
+            <a:solidFill>
+              <a:srgbClr val="92D050"/>
+            </a:solidFill>
+            <a:ln w="25400">
+              <a:solidFill>
+                <a:schemeClr val="tx1"/>
+              </a:solidFill>
+            </a:ln>
+          </p:spPr>
+          <p:txBody>
+            <a:bodyPr wrap="square" rtlCol="0">
+              <a:spAutoFit/>
+            </a:bodyPr>
+            <a:lstStyle/>
+            <a:p>
+              <a:pPr algn="ctr"/>
+              <a:endParaRPr lang="en-GB" b="1" dirty="0"/>
+            </a:p>
+            <a:p>
+              <a:pPr algn="ctr"/>
+              <a:r>
+                <a:rPr lang="en-GB" b="1" dirty="0"/>
+                <a:t>User</a:t>
+              </a:r>
+            </a:p>
+            <a:p>
+              <a:endParaRPr lang="en-GB" b="1" dirty="0"/>
+            </a:p>
+          </p:txBody>
+        </p:sp>
+        <p:sp>
+          <p:nvSpPr>
+            <p:cNvPr id="7" name="TextBox 6"/>
+            <p:cNvSpPr txBox="1"/>
+            <p:nvPr/>
+          </p:nvSpPr>
+          <p:spPr>
+            <a:xfrm>
+              <a:off x="3505200" y="2819400"/>
+              <a:ext cx="1371600" cy="923330"/>
+            </a:xfrm>
+            <a:prstGeom prst="rect">
+              <a:avLst/>
+            </a:prstGeom>
+            <a:solidFill>
+              <a:srgbClr val="92D050"/>
+            </a:solidFill>
+            <a:ln w="25400">
+              <a:solidFill>
+                <a:schemeClr val="tx1"/>
+              </a:solidFill>
+            </a:ln>
+          </p:spPr>
+          <p:txBody>
+            <a:bodyPr wrap="square" rtlCol="0">
+              <a:spAutoFit/>
+            </a:bodyPr>
+            <a:lstStyle/>
+            <a:p>
+              <a:pPr algn="ctr"/>
+              <a:endParaRPr lang="en-GB" b="1" dirty="0"/>
+            </a:p>
+            <a:p>
+              <a:pPr algn="ctr"/>
+              <a:r>
+                <a:rPr lang="en-GB" b="1" dirty="0"/>
+                <a:t>Recipe</a:t>
+              </a:r>
+            </a:p>
+            <a:p>
+              <a:endParaRPr lang="en-GB" b="1" dirty="0"/>
+            </a:p>
+          </p:txBody>
+        </p:sp>
+        <p:sp>
+          <p:nvSpPr>
+            <p:cNvPr id="8" name="TextBox 7"/>
+            <p:cNvSpPr txBox="1"/>
+            <p:nvPr/>
+          </p:nvSpPr>
+          <p:spPr>
+            <a:xfrm>
+              <a:off x="6184900" y="4035628"/>
+              <a:ext cx="1371600" cy="923330"/>
+            </a:xfrm>
+            <a:prstGeom prst="rect">
+              <a:avLst/>
+            </a:prstGeom>
+            <a:solidFill>
+              <a:srgbClr val="92D050"/>
+            </a:solidFill>
+            <a:ln w="25400">
+              <a:solidFill>
+                <a:schemeClr val="tx1"/>
+              </a:solidFill>
+            </a:ln>
+          </p:spPr>
+          <p:txBody>
+            <a:bodyPr wrap="square" rtlCol="0">
+              <a:spAutoFit/>
+            </a:bodyPr>
+            <a:lstStyle/>
+            <a:p>
+              <a:pPr algn="ctr"/>
+              <a:endParaRPr lang="en-GB" b="1" dirty="0"/>
+            </a:p>
+            <a:p>
+              <a:pPr algn="ctr"/>
+              <a:r>
+                <a:rPr lang="en-GB" b="1" dirty="0"/>
+                <a:t>Category</a:t>
+              </a:r>
+            </a:p>
+            <a:p>
+              <a:endParaRPr lang="en-GB" b="1" dirty="0"/>
+            </a:p>
+          </p:txBody>
+        </p:sp>
+        <p:cxnSp>
+          <p:nvCxnSpPr>
+            <p:cNvPr id="11" name="Straight Connector 10"/>
+            <p:cNvCxnSpPr>
+              <a:stCxn id="66" idx="3"/>
+              <a:endCxn id="7" idx="1"/>
+            </p:cNvCxnSpPr>
+            <p:nvPr/>
+          </p:nvCxnSpPr>
+          <p:spPr>
+            <a:xfrm flipV="1">
+              <a:off x="3031490" y="3281065"/>
+              <a:ext cx="473710" cy="2229"/>
+            </a:xfrm>
+            <a:prstGeom prst="line">
+              <a:avLst/>
+            </a:prstGeom>
+            <a:ln w="25400">
+              <a:solidFill>
+                <a:schemeClr val="tx1"/>
+              </a:solidFill>
+            </a:ln>
+          </p:spPr>
+          <p:style>
+            <a:lnRef idx="1">
+              <a:schemeClr val="accent1"/>
+            </a:lnRef>
+            <a:fillRef idx="0">
+              <a:schemeClr val="accent1"/>
+            </a:fillRef>
+            <a:effectRef idx="0">
+              <a:schemeClr val="accent1"/>
+            </a:effectRef>
+            <a:fontRef idx="minor">
+              <a:schemeClr val="tx1"/>
+            </a:fontRef>
+          </p:style>
+        </p:cxnSp>
+        <p:cxnSp>
+          <p:nvCxnSpPr>
+            <p:cNvPr id="12" name="Straight Connector 11"/>
+            <p:cNvCxnSpPr>
+              <a:stCxn id="7" idx="3"/>
+              <a:endCxn id="80" idx="1"/>
+            </p:cNvCxnSpPr>
+            <p:nvPr/>
+          </p:nvCxnSpPr>
+          <p:spPr>
+            <a:xfrm flipV="1">
+              <a:off x="4876800" y="3279574"/>
+              <a:ext cx="1308099" cy="1491"/>
+            </a:xfrm>
+            <a:prstGeom prst="line">
+              <a:avLst/>
+            </a:prstGeom>
+            <a:ln w="25400">
+              <a:solidFill>
+                <a:schemeClr val="tx1"/>
+              </a:solidFill>
+            </a:ln>
+          </p:spPr>
+          <p:style>
+            <a:lnRef idx="1">
+              <a:schemeClr val="accent1"/>
+            </a:lnRef>
+            <a:fillRef idx="0">
+              <a:schemeClr val="accent1"/>
+            </a:fillRef>
+            <a:effectRef idx="0">
+              <a:schemeClr val="accent1"/>
+            </a:effectRef>
+            <a:fontRef idx="minor">
+              <a:schemeClr val="tx1"/>
+            </a:fontRef>
+          </p:style>
+        </p:cxnSp>
+        <p:sp>
+          <p:nvSpPr>
+            <p:cNvPr id="18" name="TextBox 17"/>
+            <p:cNvSpPr txBox="1"/>
+            <p:nvPr/>
+          </p:nvSpPr>
+          <p:spPr>
+            <a:xfrm>
+              <a:off x="3200400" y="2971799"/>
+              <a:ext cx="304800" cy="307777"/>
+            </a:xfrm>
+            <a:prstGeom prst="rect">
+              <a:avLst/>
+            </a:prstGeom>
+            <a:noFill/>
+          </p:spPr>
+          <p:txBody>
+            <a:bodyPr wrap="square" rtlCol="0">
+              <a:spAutoFit/>
+            </a:bodyPr>
+            <a:lstStyle/>
+            <a:p>
+              <a:r>
+                <a:rPr lang="en-GB" sz="1400" b="1" dirty="0"/>
+                <a:t>M</a:t>
+              </a:r>
+            </a:p>
+          </p:txBody>
+        </p:sp>
+        <p:sp>
+          <p:nvSpPr>
+            <p:cNvPr id="20" name="TextBox 19"/>
+            <p:cNvSpPr txBox="1"/>
+            <p:nvPr/>
+          </p:nvSpPr>
+          <p:spPr>
+            <a:xfrm>
+              <a:off x="1143000" y="2971800"/>
+              <a:ext cx="304800" cy="307777"/>
+            </a:xfrm>
+            <a:prstGeom prst="rect">
+              <a:avLst/>
+            </a:prstGeom>
+            <a:noFill/>
+          </p:spPr>
+          <p:txBody>
+            <a:bodyPr wrap="square" rtlCol="0">
+              <a:spAutoFit/>
+            </a:bodyPr>
+            <a:lstStyle/>
+            <a:p>
+              <a:r>
+                <a:rPr lang="en-GB" sz="1400" b="1" dirty="0"/>
+                <a:t>1</a:t>
+              </a:r>
+            </a:p>
+          </p:txBody>
+        </p:sp>
+        <p:sp>
+          <p:nvSpPr>
+            <p:cNvPr id="22" name="TextBox 21"/>
+            <p:cNvSpPr txBox="1"/>
+            <p:nvPr/>
+          </p:nvSpPr>
+          <p:spPr>
+            <a:xfrm>
+              <a:off x="4864100" y="2973288"/>
+              <a:ext cx="304800" cy="307777"/>
+            </a:xfrm>
+            <a:prstGeom prst="rect">
+              <a:avLst/>
+            </a:prstGeom>
+            <a:noFill/>
+          </p:spPr>
+          <p:txBody>
+            <a:bodyPr wrap="square" rtlCol="0">
+              <a:spAutoFit/>
+            </a:bodyPr>
+            <a:lstStyle/>
+            <a:p>
+              <a:r>
+                <a:rPr lang="en-GB" sz="1400" b="1" dirty="0"/>
+                <a:t>M</a:t>
+              </a:r>
+            </a:p>
+          </p:txBody>
+        </p:sp>
+        <p:sp>
+          <p:nvSpPr>
+            <p:cNvPr id="23" name="TextBox 22"/>
+            <p:cNvSpPr txBox="1"/>
+            <p:nvPr/>
+          </p:nvSpPr>
+          <p:spPr>
+            <a:xfrm>
+              <a:off x="4191001" y="3741984"/>
+              <a:ext cx="304800" cy="307777"/>
+            </a:xfrm>
+            <a:prstGeom prst="rect">
+              <a:avLst/>
+            </a:prstGeom>
+            <a:noFill/>
+          </p:spPr>
+          <p:txBody>
+            <a:bodyPr wrap="square" rtlCol="0">
+              <a:spAutoFit/>
+            </a:bodyPr>
+            <a:lstStyle/>
+            <a:p>
+              <a:r>
+                <a:rPr lang="en-GB" sz="1400" b="1" dirty="0"/>
+                <a:t>1</a:t>
+              </a:r>
+            </a:p>
+          </p:txBody>
+        </p:sp>
+      </p:grpSp>
+      <p:grpSp>
+        <p:nvGrpSpPr>
+          <p:cNvPr id="28" name="Group 27"/>
+          <p:cNvGrpSpPr/>
+          <p:nvPr/>
+        </p:nvGrpSpPr>
+        <p:grpSpPr>
+          <a:xfrm>
+            <a:off x="792550" y="2585888"/>
+            <a:ext cx="1219200" cy="828223"/>
+            <a:chOff x="838200" y="2065346"/>
+            <a:chExt cx="1219200" cy="828223"/>
+          </a:xfrm>
+        </p:grpSpPr>
+        <p:sp>
+          <p:nvSpPr>
+            <p:cNvPr id="25" name="TextBox 24"/>
+            <p:cNvSpPr txBox="1"/>
+            <p:nvPr/>
+          </p:nvSpPr>
+          <p:spPr>
+            <a:xfrm>
+              <a:off x="838200" y="2065346"/>
+              <a:ext cx="1219200" cy="646331"/>
+            </a:xfrm>
+            <a:prstGeom prst="rect">
+              <a:avLst/>
+            </a:prstGeom>
+            <a:solidFill>
+              <a:schemeClr val="accent3">
+                <a:lumMod val="60000"/>
+                <a:lumOff val="40000"/>
+              </a:schemeClr>
+            </a:solidFill>
+            <a:ln w="12700">
+              <a:solidFill>
+                <a:schemeClr val="tx1"/>
+              </a:solidFill>
+            </a:ln>
+          </p:spPr>
+          <p:txBody>
+            <a:bodyPr wrap="square" rtlCol="0">
+              <a:spAutoFit/>
+            </a:bodyPr>
+            <a:lstStyle/>
+            <a:p>
+              <a:pPr algn="ctr"/>
+              <a:r>
+                <a:rPr lang="en-GB" sz="1200" u="sng" dirty="0"/>
+                <a:t>Username (PK)</a:t>
+              </a:r>
+            </a:p>
+            <a:p>
+              <a:pPr algn="ctr"/>
+              <a:r>
+                <a:rPr lang="en-GB" sz="1200" dirty="0"/>
+                <a:t>Email Address</a:t>
+              </a:r>
+            </a:p>
+            <a:p>
+              <a:pPr algn="ctr"/>
+              <a:r>
+                <a:rPr lang="en-GB" sz="1200" dirty="0"/>
+                <a:t>Password</a:t>
+              </a:r>
+            </a:p>
+          </p:txBody>
+        </p:sp>
+        <p:cxnSp>
+          <p:nvCxnSpPr>
+            <p:cNvPr id="27" name="Straight Connector 26"/>
+            <p:cNvCxnSpPr>
+              <a:stCxn id="6" idx="0"/>
+              <a:endCxn id="25" idx="2"/>
+            </p:cNvCxnSpPr>
+            <p:nvPr/>
+          </p:nvCxnSpPr>
+          <p:spPr>
+            <a:xfrm flipV="1">
+              <a:off x="1447800" y="2711677"/>
+              <a:ext cx="0" cy="181892"/>
+            </a:xfrm>
+            <a:prstGeom prst="line">
+              <a:avLst/>
+            </a:prstGeom>
+            <a:ln w="12700">
+              <a:solidFill>
+                <a:schemeClr val="tx1"/>
+              </a:solidFill>
+            </a:ln>
+          </p:spPr>
+          <p:style>
+            <a:lnRef idx="1">
+              <a:schemeClr val="accent1"/>
+            </a:lnRef>
+            <a:fillRef idx="0">
+              <a:schemeClr val="accent1"/>
+            </a:fillRef>
+            <a:effectRef idx="0">
+              <a:schemeClr val="accent1"/>
+            </a:effectRef>
+            <a:fontRef idx="minor">
+              <a:schemeClr val="tx1"/>
+            </a:fontRef>
+          </p:style>
+        </p:cxnSp>
+      </p:grpSp>
+      <p:grpSp>
+        <p:nvGrpSpPr>
+          <p:cNvPr id="29" name="Group 28"/>
+          <p:cNvGrpSpPr/>
+          <p:nvPr/>
+        </p:nvGrpSpPr>
+        <p:grpSpPr>
+          <a:xfrm>
+            <a:off x="4495800" y="133049"/>
+            <a:ext cx="1219200" cy="3282554"/>
+            <a:chOff x="838200" y="2065345"/>
+            <a:chExt cx="1219200" cy="830766"/>
+          </a:xfrm>
+        </p:grpSpPr>
+        <p:sp>
+          <p:nvSpPr>
+            <p:cNvPr id="30" name="TextBox 29"/>
+            <p:cNvSpPr txBox="1"/>
+            <p:nvPr/>
+          </p:nvSpPr>
+          <p:spPr>
+            <a:xfrm>
+              <a:off x="838200" y="2065345"/>
+              <a:ext cx="1219200" cy="630939"/>
+            </a:xfrm>
+            <a:prstGeom prst="rect">
+              <a:avLst/>
+            </a:prstGeom>
+            <a:solidFill>
+              <a:schemeClr val="accent3">
+                <a:lumMod val="60000"/>
+                <a:lumOff val="40000"/>
+              </a:schemeClr>
+            </a:solidFill>
+            <a:ln w="12700">
+              <a:solidFill>
+                <a:schemeClr val="tx1"/>
+              </a:solidFill>
+            </a:ln>
+          </p:spPr>
+          <p:txBody>
+            <a:bodyPr wrap="square" rtlCol="0">
+              <a:spAutoFit/>
+            </a:bodyPr>
+            <a:lstStyle/>
+            <a:p>
+              <a:pPr algn="ctr"/>
+              <a:r>
+                <a:rPr lang="en-GB" sz="1200" u="sng" dirty="0"/>
+                <a:t>Name (PK)</a:t>
+              </a:r>
+            </a:p>
+            <a:p>
+              <a:pPr algn="ctr"/>
+              <a:r>
+                <a:rPr lang="en-GB" sz="1200" u="sng" dirty="0"/>
+                <a:t>User(FK)</a:t>
+              </a:r>
+            </a:p>
+            <a:p>
+              <a:pPr algn="ctr"/>
+              <a:r>
+                <a:rPr lang="en-GB" sz="1200" dirty="0"/>
+                <a:t>Ingredients</a:t>
+              </a:r>
+            </a:p>
+            <a:p>
+              <a:pPr algn="ctr"/>
+              <a:r>
+                <a:rPr lang="en-GB" sz="1200" dirty="0"/>
+                <a:t>Serves</a:t>
+              </a:r>
+            </a:p>
+            <a:p>
+              <a:pPr algn="ctr"/>
+              <a:r>
+                <a:rPr lang="en-GB" sz="1200" dirty="0"/>
+                <a:t>Cooking  time</a:t>
+              </a:r>
+            </a:p>
+            <a:p>
+              <a:pPr algn="ctr"/>
+              <a:r>
+                <a:rPr lang="en-GB" sz="1200" dirty="0"/>
+                <a:t>Date</a:t>
+              </a:r>
+            </a:p>
+            <a:p>
+              <a:pPr algn="ctr"/>
+              <a:r>
+                <a:rPr lang="en-GB" sz="1200" dirty="0"/>
+                <a:t>Rating</a:t>
+              </a:r>
+            </a:p>
+            <a:p>
+              <a:pPr algn="ctr"/>
+              <a:r>
+                <a:rPr lang="en-GB" sz="1200" dirty="0"/>
+                <a:t>Picture</a:t>
+              </a:r>
+            </a:p>
+            <a:p>
+              <a:pPr algn="ctr"/>
+              <a:r>
+                <a:rPr lang="en-GB" sz="1200" dirty="0"/>
+                <a:t>Views</a:t>
+              </a:r>
+            </a:p>
+            <a:p>
+              <a:pPr algn="ctr"/>
+              <a:r>
+                <a:rPr lang="en-GB" sz="1200" dirty="0" err="1"/>
+                <a:t>isVegetarian</a:t>
+              </a:r>
+              <a:endParaRPr lang="en-GB" sz="1200" dirty="0"/>
+            </a:p>
+            <a:p>
+              <a:pPr algn="ctr"/>
+              <a:r>
+                <a:rPr lang="en-GB" sz="1200" dirty="0" err="1"/>
+                <a:t>isVegan</a:t>
+              </a:r>
+              <a:endParaRPr lang="en-GB" sz="1200" dirty="0"/>
+            </a:p>
+            <a:p>
+              <a:pPr algn="ctr"/>
+              <a:r>
+                <a:rPr lang="en-GB" sz="1200" dirty="0" err="1"/>
+                <a:t>isGF</a:t>
+              </a:r>
+              <a:endParaRPr lang="en-GB" sz="1200" dirty="0"/>
+            </a:p>
+            <a:p>
+              <a:pPr algn="ctr"/>
+              <a:r>
+                <a:rPr lang="en-GB" sz="1200" dirty="0" err="1"/>
+                <a:t>isDairyFree</a:t>
+              </a:r>
+              <a:endParaRPr lang="en-GB" sz="1200" dirty="0"/>
+            </a:p>
+          </p:txBody>
+        </p:sp>
+        <p:cxnSp>
+          <p:nvCxnSpPr>
+            <p:cNvPr id="31" name="Straight Connector 30"/>
+            <p:cNvCxnSpPr>
+              <a:stCxn id="30" idx="2"/>
+              <a:endCxn id="7" idx="0"/>
+            </p:cNvCxnSpPr>
+            <p:nvPr/>
+          </p:nvCxnSpPr>
+          <p:spPr>
+            <a:xfrm>
+              <a:off x="1447800" y="2696284"/>
+              <a:ext cx="0" cy="199827"/>
+            </a:xfrm>
+            <a:prstGeom prst="line">
+              <a:avLst/>
+            </a:prstGeom>
+            <a:ln w="12700">
+              <a:solidFill>
+                <a:schemeClr val="tx1"/>
+              </a:solidFill>
+            </a:ln>
+          </p:spPr>
+          <p:style>
+            <a:lnRef idx="1">
+              <a:schemeClr val="accent1"/>
+            </a:lnRef>
+            <a:fillRef idx="0">
+              <a:schemeClr val="accent1"/>
+            </a:fillRef>
+            <a:effectRef idx="0">
+              <a:schemeClr val="accent1"/>
+            </a:effectRef>
+            <a:fontRef idx="minor">
+              <a:schemeClr val="tx1"/>
+            </a:fontRef>
+          </p:style>
+        </p:cxnSp>
+      </p:grpSp>
+      <p:grpSp>
+        <p:nvGrpSpPr>
+          <p:cNvPr id="51" name="Group 50"/>
+          <p:cNvGrpSpPr/>
+          <p:nvPr/>
+        </p:nvGrpSpPr>
+        <p:grpSpPr>
+          <a:xfrm>
+            <a:off x="7175500" y="5555161"/>
+            <a:ext cx="1219200" cy="513039"/>
+            <a:chOff x="838200" y="3117615"/>
+            <a:chExt cx="1219200" cy="781198"/>
+          </a:xfrm>
+        </p:grpSpPr>
+        <p:sp>
+          <p:nvSpPr>
+            <p:cNvPr id="52" name="TextBox 51"/>
+            <p:cNvSpPr txBox="1"/>
+            <p:nvPr/>
+          </p:nvSpPr>
+          <p:spPr>
+            <a:xfrm>
+              <a:off x="838200" y="3477030"/>
+              <a:ext cx="1219200" cy="421783"/>
+            </a:xfrm>
+            <a:prstGeom prst="rect">
+              <a:avLst/>
+            </a:prstGeom>
+            <a:solidFill>
+              <a:schemeClr val="accent3">
+                <a:lumMod val="60000"/>
+                <a:lumOff val="40000"/>
+              </a:schemeClr>
+            </a:solidFill>
+            <a:ln w="12700">
+              <a:solidFill>
+                <a:schemeClr val="tx1"/>
+              </a:solidFill>
+            </a:ln>
+          </p:spPr>
+          <p:txBody>
+            <a:bodyPr wrap="square" rtlCol="0">
+              <a:spAutoFit/>
+            </a:bodyPr>
+            <a:lstStyle/>
+            <a:p>
+              <a:pPr algn="ctr"/>
+              <a:r>
+                <a:rPr lang="en-GB" sz="1200" u="sng" dirty="0"/>
+                <a:t>Name(PK</a:t>
+              </a:r>
+              <a:r>
+                <a:rPr lang="en-GB" sz="1200" b="1" u="sng" dirty="0"/>
+                <a:t>)</a:t>
+              </a:r>
+            </a:p>
+          </p:txBody>
+        </p:sp>
+        <p:cxnSp>
+          <p:nvCxnSpPr>
+            <p:cNvPr id="53" name="Straight Connector 52"/>
+            <p:cNvCxnSpPr>
+              <a:stCxn id="52" idx="0"/>
+              <a:endCxn id="8" idx="2"/>
+            </p:cNvCxnSpPr>
+            <p:nvPr/>
+          </p:nvCxnSpPr>
+          <p:spPr>
+            <a:xfrm flipV="1">
+              <a:off x="1447800" y="3117615"/>
+              <a:ext cx="0" cy="359415"/>
+            </a:xfrm>
+            <a:prstGeom prst="line">
+              <a:avLst/>
+            </a:prstGeom>
+            <a:ln w="12700">
+              <a:solidFill>
+                <a:schemeClr val="tx1"/>
+              </a:solidFill>
+            </a:ln>
+          </p:spPr>
+          <p:style>
+            <a:lnRef idx="1">
+              <a:schemeClr val="accent1"/>
+            </a:lnRef>
+            <a:fillRef idx="0">
+              <a:schemeClr val="accent1"/>
+            </a:fillRef>
+            <a:effectRef idx="0">
+              <a:schemeClr val="accent1"/>
+            </a:effectRef>
+            <a:fontRef idx="minor">
+              <a:schemeClr val="tx1"/>
+            </a:fontRef>
+          </p:style>
+        </p:cxnSp>
+      </p:grpSp>
+      <p:sp>
+        <p:nvSpPr>
+          <p:cNvPr id="56" name="TextBox 55"/>
+          <p:cNvSpPr txBox="1"/>
+          <p:nvPr/>
+        </p:nvSpPr>
+        <p:spPr>
+          <a:xfrm>
+            <a:off x="533400" y="304800"/>
+            <a:ext cx="2286000" cy="584775"/>
+          </a:xfrm>
+          <a:prstGeom prst="rect">
+            <a:avLst/>
+          </a:prstGeom>
+          <a:noFill/>
+        </p:spPr>
+        <p:txBody>
+          <a:bodyPr wrap="square" rtlCol="0">
+            <a:spAutoFit/>
+          </a:bodyPr>
+          <a:lstStyle/>
+          <a:p>
+            <a:r>
+              <a:rPr lang="en-GB" sz="3200" b="1" dirty="0"/>
+              <a:t>ER Diagram</a:t>
+            </a:r>
+          </a:p>
+        </p:txBody>
+      </p:sp>
+      <p:sp>
+        <p:nvSpPr>
+          <p:cNvPr id="75" name="TextBox 74"/>
+          <p:cNvSpPr txBox="1"/>
+          <p:nvPr/>
+        </p:nvSpPr>
+        <p:spPr>
+          <a:xfrm>
+            <a:off x="2567975" y="4635550"/>
+            <a:ext cx="1371600" cy="923330"/>
+          </a:xfrm>
+          <a:prstGeom prst="rect">
+            <a:avLst/>
+          </a:prstGeom>
+          <a:solidFill>
+            <a:srgbClr val="92D050"/>
+          </a:solidFill>
+          <a:ln w="25400">
+            <a:solidFill>
+              <a:schemeClr val="tx1"/>
+            </a:solidFill>
+          </a:ln>
+        </p:spPr>
+        <p:txBody>
+          <a:bodyPr wrap="square" rtlCol="0">
+            <a:spAutoFit/>
+          </a:bodyPr>
+          <a:lstStyle/>
+          <a:p>
+            <a:pPr algn="ctr"/>
+            <a:endParaRPr lang="en-GB" b="1" dirty="0"/>
+          </a:p>
+          <a:p>
+            <a:pPr algn="ctr"/>
+            <a:r>
+              <a:rPr lang="en-GB" b="1" dirty="0"/>
+              <a:t>Comment</a:t>
+            </a:r>
+          </a:p>
+          <a:p>
+            <a:endParaRPr lang="en-GB" b="1" dirty="0"/>
+          </a:p>
+        </p:txBody>
+      </p:sp>
+      <p:cxnSp>
+        <p:nvCxnSpPr>
+          <p:cNvPr id="76" name="Straight Connector 75"/>
+          <p:cNvCxnSpPr>
+            <a:stCxn id="7" idx="2"/>
+            <a:endCxn id="33" idx="0"/>
+          </p:cNvCxnSpPr>
+          <p:nvPr/>
+        </p:nvCxnSpPr>
+        <p:spPr>
+          <a:xfrm>
+            <a:off x="5105400" y="4338932"/>
+            <a:ext cx="0" cy="306286"/>
+          </a:xfrm>
+          <a:prstGeom prst="line">
+            <a:avLst/>
+          </a:prstGeom>
+          <a:ln w="25400">
+            <a:solidFill>
+              <a:schemeClr val="tx1"/>
+            </a:solidFill>
+          </a:ln>
+        </p:spPr>
+        <p:style>
+          <a:lnRef idx="1">
+            <a:schemeClr val="accent1"/>
+          </a:lnRef>
+          <a:fillRef idx="0">
+            <a:schemeClr val="accent1"/>
+          </a:fillRef>
+          <a:effectRef idx="0">
+            <a:schemeClr val="accent1"/>
+          </a:effectRef>
+          <a:fontRef idx="minor">
+            <a:schemeClr val="tx1"/>
+          </a:fontRef>
+        </p:style>
+      </p:cxnSp>
+      <p:sp>
+        <p:nvSpPr>
+          <p:cNvPr id="81" name="TextBox 80"/>
+          <p:cNvSpPr txBox="1"/>
+          <p:nvPr/>
+        </p:nvSpPr>
+        <p:spPr>
+          <a:xfrm>
+            <a:off x="3939575" y="4792412"/>
+            <a:ext cx="304800" cy="307777"/>
+          </a:xfrm>
+          <a:prstGeom prst="rect">
+            <a:avLst/>
+          </a:prstGeom>
+          <a:noFill/>
+        </p:spPr>
+        <p:txBody>
+          <a:bodyPr wrap="square" rtlCol="0">
+            <a:spAutoFit/>
+          </a:bodyPr>
+          <a:lstStyle/>
+          <a:p>
+            <a:r>
+              <a:rPr lang="en-GB" sz="1400" b="1" dirty="0"/>
+              <a:t>M</a:t>
+            </a:r>
+          </a:p>
+        </p:txBody>
+      </p:sp>
+      <p:sp>
+        <p:nvSpPr>
+          <p:cNvPr id="92" name="TextBox 91"/>
+          <p:cNvSpPr txBox="1"/>
+          <p:nvPr/>
+        </p:nvSpPr>
+        <p:spPr>
+          <a:xfrm>
+            <a:off x="7785099" y="4340027"/>
+            <a:ext cx="304800" cy="307777"/>
+          </a:xfrm>
+          <a:prstGeom prst="rect">
+            <a:avLst/>
+          </a:prstGeom>
+          <a:noFill/>
+        </p:spPr>
+        <p:txBody>
+          <a:bodyPr wrap="square" rtlCol="0">
+            <a:spAutoFit/>
+          </a:bodyPr>
+          <a:lstStyle/>
+          <a:p>
+            <a:r>
+              <a:rPr lang="en-GB" sz="1400" b="1" dirty="0"/>
+              <a:t>1</a:t>
+            </a:r>
+          </a:p>
+        </p:txBody>
+      </p:sp>
+      <p:sp>
+        <p:nvSpPr>
+          <p:cNvPr id="94" name="TextBox 93"/>
+          <p:cNvSpPr txBox="1"/>
+          <p:nvPr/>
+        </p:nvSpPr>
+        <p:spPr>
+          <a:xfrm>
+            <a:off x="2644175" y="5791200"/>
+            <a:ext cx="1219200" cy="830997"/>
+          </a:xfrm>
+          <a:prstGeom prst="rect">
+            <a:avLst/>
+          </a:prstGeom>
+          <a:solidFill>
+            <a:schemeClr val="accent3">
+              <a:lumMod val="60000"/>
+              <a:lumOff val="40000"/>
+            </a:schemeClr>
+          </a:solidFill>
+          <a:ln w="12700">
+            <a:solidFill>
+              <a:schemeClr val="tx1"/>
+            </a:solidFill>
+          </a:ln>
+        </p:spPr>
+        <p:txBody>
+          <a:bodyPr wrap="square" rtlCol="0">
+            <a:spAutoFit/>
+          </a:bodyPr>
+          <a:lstStyle/>
+          <a:p>
+            <a:pPr algn="ctr"/>
+            <a:r>
+              <a:rPr lang="en-GB" sz="1200" u="sng" dirty="0"/>
+              <a:t>User(FK)</a:t>
+            </a:r>
+          </a:p>
+          <a:p>
+            <a:pPr algn="ctr"/>
+            <a:r>
+              <a:rPr lang="en-GB" sz="1200" u="sng" dirty="0"/>
+              <a:t>Recipe(FK)</a:t>
+            </a:r>
+          </a:p>
+          <a:p>
+            <a:pPr algn="ctr"/>
+            <a:r>
+              <a:rPr lang="en-GB" sz="1200" dirty="0"/>
+              <a:t>Text</a:t>
+            </a:r>
+          </a:p>
+          <a:p>
+            <a:pPr algn="ctr"/>
+            <a:r>
+              <a:rPr lang="en-GB" sz="1200" dirty="0"/>
+              <a:t>Date-time</a:t>
+            </a:r>
+          </a:p>
+        </p:txBody>
+      </p:sp>
+      <p:cxnSp>
+        <p:nvCxnSpPr>
+          <p:cNvPr id="96" name="Straight Connector 95"/>
+          <p:cNvCxnSpPr>
+            <a:stCxn id="75" idx="2"/>
+            <a:endCxn id="94" idx="0"/>
+          </p:cNvCxnSpPr>
+          <p:nvPr/>
+        </p:nvCxnSpPr>
+        <p:spPr>
+          <a:xfrm>
+            <a:off x="3253775" y="5558880"/>
+            <a:ext cx="0" cy="232320"/>
+          </a:xfrm>
+          <a:prstGeom prst="line">
+            <a:avLst/>
+          </a:prstGeom>
+          <a:ln w="12700">
+            <a:solidFill>
+              <a:schemeClr val="tx1"/>
+            </a:solidFill>
+          </a:ln>
+        </p:spPr>
+        <p:style>
+          <a:lnRef idx="1">
+            <a:schemeClr val="accent1"/>
+          </a:lnRef>
+          <a:fillRef idx="0">
+            <a:schemeClr val="accent1"/>
+          </a:fillRef>
+          <a:effectRef idx="0">
+            <a:schemeClr val="accent1"/>
+          </a:effectRef>
+          <a:fontRef idx="minor">
+            <a:schemeClr val="tx1"/>
+          </a:fontRef>
+        </p:style>
+      </p:cxnSp>
+      <p:sp>
+        <p:nvSpPr>
+          <p:cNvPr id="33" name="Diamond 32"/>
+          <p:cNvSpPr/>
+          <p:nvPr/>
+        </p:nvSpPr>
+        <p:spPr>
+          <a:xfrm>
+            <a:off x="4419600" y="4645218"/>
+            <a:ext cx="1371600" cy="915890"/>
+          </a:xfrm>
+          <a:prstGeom prst="diamond">
+            <a:avLst/>
+          </a:prstGeom>
+          <a:solidFill>
+            <a:srgbClr val="FF8521"/>
+          </a:solidFill>
+          <a:ln>
+            <a:solidFill>
+              <a:srgbClr val="000000"/>
+            </a:solidFill>
+          </a:ln>
+        </p:spPr>
+        <p:style>
+          <a:lnRef idx="2">
+            <a:schemeClr val="accent1">
+              <a:shade val="50000"/>
+            </a:schemeClr>
+          </a:lnRef>
+          <a:fillRef idx="1">
+            <a:schemeClr val="accent1"/>
+          </a:fillRef>
+          <a:effectRef idx="0">
+            <a:schemeClr val="accent1"/>
+          </a:effectRef>
+          <a:fontRef idx="minor">
+            <a:schemeClr val="lt1"/>
+          </a:fontRef>
+        </p:style>
+        <p:txBody>
+          <a:bodyPr rtlCol="0" anchor="ctr"/>
+          <a:lstStyle/>
+          <a:p>
+            <a:pPr algn="ctr"/>
+            <a:endParaRPr lang="en-GB"/>
+          </a:p>
+        </p:txBody>
+      </p:sp>
+      <p:sp>
+        <p:nvSpPr>
+          <p:cNvPr id="45" name="Diamond 44"/>
+          <p:cNvSpPr/>
+          <p:nvPr/>
+        </p:nvSpPr>
+        <p:spPr>
+          <a:xfrm>
+            <a:off x="716350" y="4639270"/>
+            <a:ext cx="1371600" cy="915890"/>
+          </a:xfrm>
+          <a:prstGeom prst="diamond">
+            <a:avLst/>
+          </a:prstGeom>
+          <a:solidFill>
+            <a:srgbClr val="FF8521"/>
+          </a:solidFill>
+          <a:ln>
+            <a:solidFill>
+              <a:srgbClr val="000000"/>
+            </a:solidFill>
+          </a:ln>
+        </p:spPr>
+        <p:style>
+          <a:lnRef idx="2">
+            <a:schemeClr val="accent1">
+              <a:shade val="50000"/>
+            </a:schemeClr>
+          </a:lnRef>
+          <a:fillRef idx="1">
+            <a:schemeClr val="accent1"/>
+          </a:fillRef>
+          <a:effectRef idx="0">
+            <a:schemeClr val="accent1"/>
+          </a:effectRef>
+          <a:fontRef idx="minor">
+            <a:schemeClr val="lt1"/>
+          </a:fontRef>
+        </p:style>
+        <p:txBody>
+          <a:bodyPr rtlCol="0" anchor="ctr"/>
+          <a:lstStyle/>
+          <a:p>
+            <a:pPr algn="ctr"/>
+            <a:endParaRPr lang="en-GB"/>
+          </a:p>
+        </p:txBody>
+      </p:sp>
+      <p:cxnSp>
+        <p:nvCxnSpPr>
+          <p:cNvPr id="48" name="Straight Connector 47"/>
+          <p:cNvCxnSpPr>
+            <a:stCxn id="6" idx="2"/>
+            <a:endCxn id="45" idx="0"/>
+          </p:cNvCxnSpPr>
+          <p:nvPr/>
+        </p:nvCxnSpPr>
+        <p:spPr>
+          <a:xfrm>
+            <a:off x="1402150" y="4337441"/>
+            <a:ext cx="0" cy="301829"/>
+          </a:xfrm>
+          <a:prstGeom prst="line">
+            <a:avLst/>
+          </a:prstGeom>
+          <a:ln w="25400">
+            <a:solidFill>
+              <a:schemeClr val="tx1"/>
+            </a:solidFill>
+          </a:ln>
+        </p:spPr>
+        <p:style>
+          <a:lnRef idx="1">
+            <a:schemeClr val="accent1"/>
+          </a:lnRef>
+          <a:fillRef idx="0">
+            <a:schemeClr val="accent1"/>
+          </a:fillRef>
+          <a:effectRef idx="0">
+            <a:schemeClr val="accent1"/>
+          </a:effectRef>
+          <a:fontRef idx="minor">
+            <a:schemeClr val="tx1"/>
+          </a:fontRef>
+        </p:style>
+      </p:cxnSp>
+      <p:cxnSp>
+        <p:nvCxnSpPr>
+          <p:cNvPr id="54" name="Straight Connector 53"/>
+          <p:cNvCxnSpPr>
+            <a:stCxn id="45" idx="3"/>
+            <a:endCxn id="75" idx="1"/>
+          </p:cNvCxnSpPr>
+          <p:nvPr/>
+        </p:nvCxnSpPr>
+        <p:spPr>
+          <a:xfrm>
+            <a:off x="2087950" y="5097215"/>
+            <a:ext cx="480025" cy="0"/>
+          </a:xfrm>
+          <a:prstGeom prst="line">
+            <a:avLst/>
+          </a:prstGeom>
+          <a:ln w="25400">
+            <a:solidFill>
+              <a:schemeClr val="tx1"/>
+            </a:solidFill>
+          </a:ln>
+        </p:spPr>
+        <p:style>
+          <a:lnRef idx="1">
+            <a:schemeClr val="accent1"/>
+          </a:lnRef>
+          <a:fillRef idx="0">
+            <a:schemeClr val="accent1"/>
+          </a:fillRef>
+          <a:effectRef idx="0">
+            <a:schemeClr val="accent1"/>
+          </a:effectRef>
+          <a:fontRef idx="minor">
+            <a:schemeClr val="tx1"/>
+          </a:fontRef>
+        </p:style>
+      </p:cxnSp>
+      <p:cxnSp>
+        <p:nvCxnSpPr>
+          <p:cNvPr id="55" name="Straight Connector 54"/>
+          <p:cNvCxnSpPr>
+            <a:stCxn id="75" idx="3"/>
+            <a:endCxn id="33" idx="1"/>
+          </p:cNvCxnSpPr>
+          <p:nvPr/>
+        </p:nvCxnSpPr>
+        <p:spPr>
+          <a:xfrm>
+            <a:off x="3939575" y="5097215"/>
+            <a:ext cx="480025" cy="5948"/>
+          </a:xfrm>
+          <a:prstGeom prst="line">
+            <a:avLst/>
+          </a:prstGeom>
+          <a:ln w="25400">
+            <a:solidFill>
+              <a:schemeClr val="tx1"/>
+            </a:solidFill>
+          </a:ln>
+        </p:spPr>
+        <p:style>
+          <a:lnRef idx="1">
+            <a:schemeClr val="accent1"/>
+          </a:lnRef>
+          <a:fillRef idx="0">
+            <a:schemeClr val="accent1"/>
+          </a:fillRef>
+          <a:effectRef idx="0">
+            <a:schemeClr val="accent1"/>
+          </a:effectRef>
+          <a:fontRef idx="minor">
+            <a:schemeClr val="tx1"/>
+          </a:fontRef>
+        </p:style>
+      </p:cxnSp>
+      <p:sp>
+        <p:nvSpPr>
+          <p:cNvPr id="66" name="Diamond 65"/>
+          <p:cNvSpPr/>
+          <p:nvPr/>
+        </p:nvSpPr>
+        <p:spPr>
+          <a:xfrm>
+            <a:off x="2574290" y="3421551"/>
+            <a:ext cx="1371600" cy="915890"/>
+          </a:xfrm>
+          <a:prstGeom prst="diamond">
+            <a:avLst/>
+          </a:prstGeom>
+          <a:solidFill>
+            <a:srgbClr val="FF8521"/>
+          </a:solidFill>
+          <a:ln>
+            <a:solidFill>
+              <a:srgbClr val="000000"/>
+            </a:solidFill>
+          </a:ln>
+        </p:spPr>
+        <p:style>
+          <a:lnRef idx="2">
+            <a:schemeClr val="accent1">
+              <a:shade val="50000"/>
+            </a:schemeClr>
+          </a:lnRef>
+          <a:fillRef idx="1">
+            <a:schemeClr val="accent1"/>
+          </a:fillRef>
+          <a:effectRef idx="0">
+            <a:schemeClr val="accent1"/>
+          </a:effectRef>
+          <a:fontRef idx="minor">
+            <a:schemeClr val="lt1"/>
+          </a:fontRef>
+        </p:style>
+        <p:txBody>
+          <a:bodyPr rtlCol="0" anchor="ctr"/>
+          <a:lstStyle/>
+          <a:p>
+            <a:pPr algn="ctr"/>
+            <a:endParaRPr lang="en-GB"/>
+          </a:p>
+        </p:txBody>
+      </p:sp>
+      <p:cxnSp>
+        <p:nvCxnSpPr>
+          <p:cNvPr id="68" name="Straight Connector 67"/>
+          <p:cNvCxnSpPr>
+            <a:stCxn id="6" idx="3"/>
+            <a:endCxn id="66" idx="1"/>
+          </p:cNvCxnSpPr>
+          <p:nvPr/>
+        </p:nvCxnSpPr>
+        <p:spPr>
+          <a:xfrm>
+            <a:off x="2087950" y="3875776"/>
+            <a:ext cx="486340" cy="3720"/>
+          </a:xfrm>
+          <a:prstGeom prst="line">
+            <a:avLst/>
+          </a:prstGeom>
+          <a:ln w="25400">
+            <a:solidFill>
+              <a:schemeClr val="tx1"/>
+            </a:solidFill>
+          </a:ln>
+        </p:spPr>
+        <p:style>
+          <a:lnRef idx="1">
+            <a:schemeClr val="accent1"/>
+          </a:lnRef>
+          <a:fillRef idx="0">
+            <a:schemeClr val="accent1"/>
+          </a:fillRef>
+          <a:effectRef idx="0">
+            <a:schemeClr val="accent1"/>
+          </a:effectRef>
+          <a:fontRef idx="minor">
+            <a:schemeClr val="tx1"/>
+          </a:fontRef>
+        </p:style>
+      </p:cxnSp>
+      <p:sp>
+        <p:nvSpPr>
+          <p:cNvPr id="77" name="TextBox 76"/>
+          <p:cNvSpPr txBox="1"/>
+          <p:nvPr/>
+        </p:nvSpPr>
+        <p:spPr>
+          <a:xfrm>
+            <a:off x="2225076" y="4781340"/>
+            <a:ext cx="304800" cy="307777"/>
+          </a:xfrm>
+          <a:prstGeom prst="rect">
+            <a:avLst/>
+          </a:prstGeom>
+          <a:noFill/>
+        </p:spPr>
+        <p:txBody>
+          <a:bodyPr wrap="square" rtlCol="0">
+            <a:spAutoFit/>
+          </a:bodyPr>
+          <a:lstStyle/>
+          <a:p>
+            <a:r>
+              <a:rPr lang="en-GB" sz="1400" b="1" dirty="0"/>
+              <a:t>M</a:t>
+            </a:r>
+          </a:p>
+        </p:txBody>
+      </p:sp>
+      <p:sp>
+        <p:nvSpPr>
+          <p:cNvPr id="78" name="TextBox 77"/>
+          <p:cNvSpPr txBox="1"/>
+          <p:nvPr/>
+        </p:nvSpPr>
+        <p:spPr>
+          <a:xfrm>
+            <a:off x="1402150" y="4338186"/>
+            <a:ext cx="304800" cy="307777"/>
+          </a:xfrm>
+          <a:prstGeom prst="rect">
+            <a:avLst/>
+          </a:prstGeom>
+          <a:noFill/>
+        </p:spPr>
+        <p:txBody>
+          <a:bodyPr wrap="square" rtlCol="0">
+            <a:spAutoFit/>
+          </a:bodyPr>
+          <a:lstStyle/>
+          <a:p>
+            <a:r>
+              <a:rPr lang="en-GB" sz="1400" b="1" dirty="0"/>
+              <a:t>1</a:t>
+            </a:r>
+          </a:p>
+        </p:txBody>
+      </p:sp>
+      <p:sp>
+        <p:nvSpPr>
+          <p:cNvPr id="69" name="TextBox 68"/>
+          <p:cNvSpPr txBox="1"/>
+          <p:nvPr/>
+        </p:nvSpPr>
+        <p:spPr>
+          <a:xfrm>
+            <a:off x="2792728" y="3691110"/>
+            <a:ext cx="914401" cy="369332"/>
+          </a:xfrm>
+          <a:prstGeom prst="rect">
+            <a:avLst/>
+          </a:prstGeom>
+          <a:noFill/>
+        </p:spPr>
+        <p:txBody>
+          <a:bodyPr wrap="square" rtlCol="0">
+            <a:spAutoFit/>
+          </a:bodyPr>
+          <a:lstStyle/>
+          <a:p>
+            <a:pPr algn="ctr"/>
+            <a:r>
+              <a:rPr lang="en-GB" b="1" dirty="0"/>
+              <a:t>Creates</a:t>
+            </a:r>
+          </a:p>
+        </p:txBody>
+      </p:sp>
+      <p:sp>
+        <p:nvSpPr>
+          <p:cNvPr id="79" name="TextBox 78"/>
+          <p:cNvSpPr txBox="1"/>
+          <p:nvPr/>
+        </p:nvSpPr>
+        <p:spPr>
+          <a:xfrm>
+            <a:off x="944950" y="4915895"/>
+            <a:ext cx="914401" cy="369332"/>
+          </a:xfrm>
+          <a:prstGeom prst="rect">
+            <a:avLst/>
+          </a:prstGeom>
+          <a:noFill/>
+        </p:spPr>
+        <p:txBody>
+          <a:bodyPr wrap="square" rtlCol="0">
+            <a:spAutoFit/>
+          </a:bodyPr>
+          <a:lstStyle/>
+          <a:p>
+            <a:pPr algn="ctr"/>
+            <a:r>
+              <a:rPr lang="en-GB" b="1" dirty="0"/>
+              <a:t>Writes</a:t>
+            </a:r>
+          </a:p>
+        </p:txBody>
+      </p:sp>
+      <p:sp>
+        <p:nvSpPr>
+          <p:cNvPr id="80" name="Diamond 79"/>
+          <p:cNvSpPr/>
+          <p:nvPr/>
+        </p:nvSpPr>
+        <p:spPr>
+          <a:xfrm>
+            <a:off x="7099299" y="3417831"/>
+            <a:ext cx="1371600" cy="915890"/>
+          </a:xfrm>
+          <a:prstGeom prst="diamond">
+            <a:avLst/>
+          </a:prstGeom>
+          <a:solidFill>
+            <a:srgbClr val="FF8521"/>
+          </a:solidFill>
+          <a:ln>
+            <a:solidFill>
+              <a:srgbClr val="000000"/>
+            </a:solidFill>
+          </a:ln>
+        </p:spPr>
+        <p:style>
+          <a:lnRef idx="2">
+            <a:schemeClr val="accent1">
+              <a:shade val="50000"/>
+            </a:schemeClr>
+          </a:lnRef>
+          <a:fillRef idx="1">
+            <a:schemeClr val="accent1"/>
+          </a:fillRef>
+          <a:effectRef idx="0">
+            <a:schemeClr val="accent1"/>
+          </a:effectRef>
+          <a:fontRef idx="minor">
+            <a:schemeClr val="lt1"/>
+          </a:fontRef>
+        </p:style>
+        <p:txBody>
+          <a:bodyPr rtlCol="0" anchor="ctr"/>
+          <a:lstStyle/>
+          <a:p>
+            <a:pPr algn="ctr"/>
+            <a:endParaRPr lang="en-GB"/>
+          </a:p>
+        </p:txBody>
+      </p:sp>
+      <p:cxnSp>
+        <p:nvCxnSpPr>
+          <p:cNvPr id="82" name="Straight Connector 81"/>
+          <p:cNvCxnSpPr>
+            <a:stCxn id="8" idx="0"/>
+            <a:endCxn id="80" idx="2"/>
+          </p:cNvCxnSpPr>
+          <p:nvPr/>
+        </p:nvCxnSpPr>
+        <p:spPr>
+          <a:xfrm flipH="1" flipV="1">
+            <a:off x="7785099" y="4333721"/>
+            <a:ext cx="1" cy="298109"/>
+          </a:xfrm>
+          <a:prstGeom prst="line">
+            <a:avLst/>
+          </a:prstGeom>
+          <a:ln w="25400">
+            <a:solidFill>
+              <a:schemeClr val="tx1"/>
+            </a:solidFill>
+          </a:ln>
+        </p:spPr>
+        <p:style>
+          <a:lnRef idx="1">
+            <a:schemeClr val="accent1"/>
+          </a:lnRef>
+          <a:fillRef idx="0">
+            <a:schemeClr val="accent1"/>
+          </a:fillRef>
+          <a:effectRef idx="0">
+            <a:schemeClr val="accent1"/>
+          </a:effectRef>
+          <a:fontRef idx="minor">
+            <a:schemeClr val="tx1"/>
+          </a:fontRef>
+        </p:style>
+      </p:cxnSp>
+      <p:sp>
+        <p:nvSpPr>
+          <p:cNvPr id="84" name="TextBox 83"/>
+          <p:cNvSpPr txBox="1"/>
+          <p:nvPr/>
+        </p:nvSpPr>
+        <p:spPr>
+          <a:xfrm>
+            <a:off x="7321548" y="3569369"/>
+            <a:ext cx="977902" cy="646331"/>
+          </a:xfrm>
+          <a:prstGeom prst="rect">
+            <a:avLst/>
+          </a:prstGeom>
+          <a:noFill/>
+        </p:spPr>
+        <p:txBody>
+          <a:bodyPr wrap="square" rtlCol="0">
+            <a:spAutoFit/>
+          </a:bodyPr>
+          <a:lstStyle/>
+          <a:p>
+            <a:pPr algn="ctr"/>
+            <a:r>
+              <a:rPr lang="en-GB" b="1" dirty="0"/>
+              <a:t>Belongs to</a:t>
+            </a:r>
+          </a:p>
+        </p:txBody>
+      </p:sp>
+      <p:sp>
+        <p:nvSpPr>
+          <p:cNvPr id="85" name="TextBox 84"/>
+          <p:cNvSpPr txBox="1"/>
+          <p:nvPr/>
+        </p:nvSpPr>
+        <p:spPr>
+          <a:xfrm>
+            <a:off x="4648198" y="4904451"/>
+            <a:ext cx="914401" cy="369332"/>
+          </a:xfrm>
+          <a:prstGeom prst="rect">
+            <a:avLst/>
+          </a:prstGeom>
+          <a:noFill/>
+        </p:spPr>
+        <p:txBody>
+          <a:bodyPr wrap="square" rtlCol="0">
+            <a:spAutoFit/>
+          </a:bodyPr>
+          <a:lstStyle/>
+          <a:p>
+            <a:pPr algn="ctr"/>
+            <a:r>
+              <a:rPr lang="en-GB" b="1" dirty="0"/>
+              <a:t>Has</a:t>
+            </a:r>
+          </a:p>
+        </p:txBody>
+      </p:sp>
+    </p:spTree>
+    <p:extLst>
+      <p:ext uri="{BB962C8B-B14F-4D97-AF65-F5344CB8AC3E}">
+        <p14:creationId xmlns:p14="http://schemas.microsoft.com/office/powerpoint/2010/main" val="2780715523"/>
       </p:ext>
     </p:extLst>
   </p:cSld>

</xml_diff>

<commit_message>
Final changes to ER diagram.
</commit_message>
<xml_diff>
--- a/ERdiagram.pptx
+++ b/ERdiagram.pptx
@@ -305,7 +305,7 @@
           <a:p>
             <a:fld id="{63167F76-22A0-48F3-8D30-B9FFC12D0B50}" type="datetimeFigureOut">
               <a:rPr lang="en-GB" smtClean="0"/>
-              <a:t>22/02/2017</a:t>
+              <a:t>23/02/2017</a:t>
             </a:fld>
             <a:endParaRPr lang="en-GB"/>
           </a:p>
@@ -475,7 +475,7 @@
           <a:p>
             <a:fld id="{63167F76-22A0-48F3-8D30-B9FFC12D0B50}" type="datetimeFigureOut">
               <a:rPr lang="en-GB" smtClean="0"/>
-              <a:t>22/02/2017</a:t>
+              <a:t>23/02/2017</a:t>
             </a:fld>
             <a:endParaRPr lang="en-GB"/>
           </a:p>
@@ -655,7 +655,7 @@
           <a:p>
             <a:fld id="{63167F76-22A0-48F3-8D30-B9FFC12D0B50}" type="datetimeFigureOut">
               <a:rPr lang="en-GB" smtClean="0"/>
-              <a:t>22/02/2017</a:t>
+              <a:t>23/02/2017</a:t>
             </a:fld>
             <a:endParaRPr lang="en-GB"/>
           </a:p>
@@ -825,7 +825,7 @@
           <a:p>
             <a:fld id="{63167F76-22A0-48F3-8D30-B9FFC12D0B50}" type="datetimeFigureOut">
               <a:rPr lang="en-GB" smtClean="0"/>
-              <a:t>22/02/2017</a:t>
+              <a:t>23/02/2017</a:t>
             </a:fld>
             <a:endParaRPr lang="en-GB"/>
           </a:p>
@@ -1071,7 +1071,7 @@
           <a:p>
             <a:fld id="{63167F76-22A0-48F3-8D30-B9FFC12D0B50}" type="datetimeFigureOut">
               <a:rPr lang="en-GB" smtClean="0"/>
-              <a:t>22/02/2017</a:t>
+              <a:t>23/02/2017</a:t>
             </a:fld>
             <a:endParaRPr lang="en-GB"/>
           </a:p>
@@ -1359,7 +1359,7 @@
           <a:p>
             <a:fld id="{63167F76-22A0-48F3-8D30-B9FFC12D0B50}" type="datetimeFigureOut">
               <a:rPr lang="en-GB" smtClean="0"/>
-              <a:t>22/02/2017</a:t>
+              <a:t>23/02/2017</a:t>
             </a:fld>
             <a:endParaRPr lang="en-GB"/>
           </a:p>
@@ -1781,7 +1781,7 @@
           <a:p>
             <a:fld id="{63167F76-22A0-48F3-8D30-B9FFC12D0B50}" type="datetimeFigureOut">
               <a:rPr lang="en-GB" smtClean="0"/>
-              <a:t>22/02/2017</a:t>
+              <a:t>23/02/2017</a:t>
             </a:fld>
             <a:endParaRPr lang="en-GB"/>
           </a:p>
@@ -1899,7 +1899,7 @@
           <a:p>
             <a:fld id="{63167F76-22A0-48F3-8D30-B9FFC12D0B50}" type="datetimeFigureOut">
               <a:rPr lang="en-GB" smtClean="0"/>
-              <a:t>22/02/2017</a:t>
+              <a:t>23/02/2017</a:t>
             </a:fld>
             <a:endParaRPr lang="en-GB"/>
           </a:p>
@@ -1994,7 +1994,7 @@
           <a:p>
             <a:fld id="{63167F76-22A0-48F3-8D30-B9FFC12D0B50}" type="datetimeFigureOut">
               <a:rPr lang="en-GB" smtClean="0"/>
-              <a:t>22/02/2017</a:t>
+              <a:t>23/02/2017</a:t>
             </a:fld>
             <a:endParaRPr lang="en-GB"/>
           </a:p>
@@ -2271,7 +2271,7 @@
           <a:p>
             <a:fld id="{63167F76-22A0-48F3-8D30-B9FFC12D0B50}" type="datetimeFigureOut">
               <a:rPr lang="en-GB" smtClean="0"/>
-              <a:t>22/02/2017</a:t>
+              <a:t>23/02/2017</a:t>
             </a:fld>
             <a:endParaRPr lang="en-GB"/>
           </a:p>
@@ -2524,7 +2524,7 @@
           <a:p>
             <a:fld id="{63167F76-22A0-48F3-8D30-B9FFC12D0B50}" type="datetimeFigureOut">
               <a:rPr lang="en-GB" smtClean="0"/>
-              <a:t>22/02/2017</a:t>
+              <a:t>23/02/2017</a:t>
             </a:fld>
             <a:endParaRPr lang="en-GB"/>
           </a:p>
@@ -2737,7 +2737,7 @@
           <a:p>
             <a:fld id="{63167F76-22A0-48F3-8D30-B9FFC12D0B50}" type="datetimeFigureOut">
               <a:rPr lang="en-GB" smtClean="0"/>
-              <a:t>22/02/2017</a:t>
+              <a:t>23/02/2017</a:t>
             </a:fld>
             <a:endParaRPr lang="en-GB"/>
           </a:p>
@@ -4135,6 +4135,76 @@
           <a:chExt cx="0" cy="0"/>
         </a:xfrm>
       </p:grpSpPr>
+      <p:cxnSp>
+        <p:nvCxnSpPr>
+          <p:cNvPr id="62" name="Straight Connector 61"/>
+          <p:cNvCxnSpPr/>
+          <p:nvPr/>
+        </p:nvCxnSpPr>
+        <p:spPr>
+          <a:xfrm>
+            <a:off x="3923100" y="5171697"/>
+            <a:ext cx="648900" cy="9903"/>
+          </a:xfrm>
+          <a:prstGeom prst="line">
+            <a:avLst/>
+          </a:prstGeom>
+          <a:ln w="25400">
+            <a:solidFill>
+              <a:schemeClr val="tx1"/>
+            </a:solidFill>
+          </a:ln>
+        </p:spPr>
+        <p:style>
+          <a:lnRef idx="1">
+            <a:schemeClr val="accent1"/>
+          </a:lnRef>
+          <a:fillRef idx="0">
+            <a:schemeClr val="accent1"/>
+          </a:fillRef>
+          <a:effectRef idx="0">
+            <a:schemeClr val="accent1"/>
+          </a:effectRef>
+          <a:fontRef idx="minor">
+            <a:schemeClr val="tx1"/>
+          </a:fontRef>
+        </p:style>
+      </p:cxnSp>
+      <p:cxnSp>
+        <p:nvCxnSpPr>
+          <p:cNvPr id="61" name="Straight Connector 60"/>
+          <p:cNvCxnSpPr/>
+          <p:nvPr/>
+        </p:nvCxnSpPr>
+        <p:spPr>
+          <a:xfrm flipV="1">
+            <a:off x="5791200" y="3886200"/>
+            <a:ext cx="1447800" cy="1"/>
+          </a:xfrm>
+          <a:prstGeom prst="line">
+            <a:avLst/>
+          </a:prstGeom>
+          <a:ln w="25400">
+            <a:solidFill>
+              <a:schemeClr val="tx1"/>
+            </a:solidFill>
+          </a:ln>
+        </p:spPr>
+        <p:style>
+          <a:lnRef idx="1">
+            <a:schemeClr val="accent1"/>
+          </a:lnRef>
+          <a:fillRef idx="0">
+            <a:schemeClr val="accent1"/>
+          </a:fillRef>
+          <a:effectRef idx="0">
+            <a:schemeClr val="accent1"/>
+          </a:effectRef>
+          <a:fontRef idx="minor">
+            <a:schemeClr val="tx1"/>
+          </a:fontRef>
+        </p:style>
+      </p:cxnSp>
       <p:grpSp>
         <p:nvGrpSpPr>
           <p:cNvPr id="32" name="Group 31"/>
@@ -4283,55 +4353,14 @@
         </p:sp>
         <p:cxnSp>
           <p:nvCxnSpPr>
-            <p:cNvPr id="11" name="Straight Connector 10"/>
-            <p:cNvCxnSpPr>
-              <a:stCxn id="66" idx="3"/>
-              <a:endCxn id="7" idx="1"/>
-            </p:cNvCxnSpPr>
+            <p:cNvPr id="12" name="Straight Connector 11"/>
+            <p:cNvCxnSpPr/>
             <p:nvPr/>
           </p:nvCxnSpPr>
           <p:spPr>
             <a:xfrm flipV="1">
-              <a:off x="3031490" y="3281065"/>
-              <a:ext cx="473710" cy="2229"/>
-            </a:xfrm>
-            <a:prstGeom prst="line">
-              <a:avLst/>
-            </a:prstGeom>
-            <a:ln w="25400">
-              <a:solidFill>
-                <a:schemeClr val="tx1"/>
-              </a:solidFill>
-            </a:ln>
-          </p:spPr>
-          <p:style>
-            <a:lnRef idx="1">
-              <a:schemeClr val="accent1"/>
-            </a:lnRef>
-            <a:fillRef idx="0">
-              <a:schemeClr val="accent1"/>
-            </a:fillRef>
-            <a:effectRef idx="0">
-              <a:schemeClr val="accent1"/>
-            </a:effectRef>
-            <a:fontRef idx="minor">
-              <a:schemeClr val="tx1"/>
-            </a:fontRef>
-          </p:style>
-        </p:cxnSp>
-        <p:cxnSp>
-          <p:nvCxnSpPr>
-            <p:cNvPr id="12" name="Straight Connector 11"/>
-            <p:cNvCxnSpPr>
-              <a:stCxn id="7" idx="3"/>
-              <a:endCxn id="80" idx="1"/>
-            </p:cNvCxnSpPr>
-            <p:nvPr/>
-          </p:nvCxnSpPr>
-          <p:spPr>
-            <a:xfrm flipV="1">
-              <a:off x="4876800" y="3279574"/>
-              <a:ext cx="1308099" cy="1491"/>
+              <a:off x="4876800" y="3366198"/>
+              <a:ext cx="1447800" cy="1"/>
             </a:xfrm>
             <a:prstGeom prst="line">
               <a:avLst/>
@@ -5263,44 +5292,6 @@
       </p:cxnSp>
       <p:cxnSp>
         <p:nvCxnSpPr>
-          <p:cNvPr id="54" name="Straight Connector 53"/>
-          <p:cNvCxnSpPr>
-            <a:stCxn id="45" idx="3"/>
-            <a:endCxn id="75" idx="1"/>
-          </p:cNvCxnSpPr>
-          <p:nvPr/>
-        </p:nvCxnSpPr>
-        <p:spPr>
-          <a:xfrm>
-            <a:off x="2087950" y="5097215"/>
-            <a:ext cx="480025" cy="0"/>
-          </a:xfrm>
-          <a:prstGeom prst="line">
-            <a:avLst/>
-          </a:prstGeom>
-          <a:ln w="25400">
-            <a:solidFill>
-              <a:schemeClr val="tx1"/>
-            </a:solidFill>
-          </a:ln>
-        </p:spPr>
-        <p:style>
-          <a:lnRef idx="1">
-            <a:schemeClr val="accent1"/>
-          </a:lnRef>
-          <a:fillRef idx="0">
-            <a:schemeClr val="accent1"/>
-          </a:fillRef>
-          <a:effectRef idx="0">
-            <a:schemeClr val="accent1"/>
-          </a:effectRef>
-          <a:fontRef idx="minor">
-            <a:schemeClr val="tx1"/>
-          </a:fontRef>
-        </p:style>
-      </p:cxnSp>
-      <p:cxnSp>
-        <p:nvCxnSpPr>
           <p:cNvPr id="55" name="Straight Connector 54"/>
           <p:cNvCxnSpPr>
             <a:stCxn id="75" idx="3"/>
@@ -5687,6 +5678,146 @@
           </a:p>
         </p:txBody>
       </p:sp>
+      <p:cxnSp>
+        <p:nvCxnSpPr>
+          <p:cNvPr id="43" name="Straight Connector 42"/>
+          <p:cNvCxnSpPr/>
+          <p:nvPr/>
+        </p:nvCxnSpPr>
+        <p:spPr>
+          <a:xfrm>
+            <a:off x="2063237" y="5105400"/>
+            <a:ext cx="504738" cy="0"/>
+          </a:xfrm>
+          <a:prstGeom prst="line">
+            <a:avLst/>
+          </a:prstGeom>
+          <a:ln w="25400">
+            <a:solidFill>
+              <a:schemeClr val="tx1"/>
+            </a:solidFill>
+          </a:ln>
+        </p:spPr>
+        <p:style>
+          <a:lnRef idx="1">
+            <a:schemeClr val="accent1"/>
+          </a:lnRef>
+          <a:fillRef idx="0">
+            <a:schemeClr val="accent1"/>
+          </a:fillRef>
+          <a:effectRef idx="0">
+            <a:schemeClr val="accent1"/>
+          </a:effectRef>
+          <a:fontRef idx="minor">
+            <a:schemeClr val="tx1"/>
+          </a:fontRef>
+        </p:style>
+      </p:cxnSp>
+      <p:cxnSp>
+        <p:nvCxnSpPr>
+          <p:cNvPr id="46" name="Straight Connector 45"/>
+          <p:cNvCxnSpPr/>
+          <p:nvPr/>
+        </p:nvCxnSpPr>
+        <p:spPr>
+          <a:xfrm rot="60000" flipV="1">
+            <a:off x="1995220" y="5029200"/>
+            <a:ext cx="556225" cy="10104"/>
+          </a:xfrm>
+          <a:prstGeom prst="line">
+            <a:avLst/>
+          </a:prstGeom>
+          <a:ln w="25400">
+            <a:solidFill>
+              <a:schemeClr val="tx1"/>
+            </a:solidFill>
+          </a:ln>
+        </p:spPr>
+        <p:style>
+          <a:lnRef idx="1">
+            <a:schemeClr val="accent1"/>
+          </a:lnRef>
+          <a:fillRef idx="0">
+            <a:schemeClr val="accent1"/>
+          </a:fillRef>
+          <a:effectRef idx="0">
+            <a:schemeClr val="accent1"/>
+          </a:effectRef>
+          <a:fontRef idx="minor">
+            <a:schemeClr val="tx1"/>
+          </a:fontRef>
+        </p:style>
+      </p:cxnSp>
+      <p:cxnSp>
+        <p:nvCxnSpPr>
+          <p:cNvPr id="57" name="Straight Connector 56"/>
+          <p:cNvCxnSpPr/>
+          <p:nvPr/>
+        </p:nvCxnSpPr>
+        <p:spPr>
+          <a:xfrm>
+            <a:off x="3931345" y="3891053"/>
+            <a:ext cx="504738" cy="0"/>
+          </a:xfrm>
+          <a:prstGeom prst="line">
+            <a:avLst/>
+          </a:prstGeom>
+          <a:ln w="25400">
+            <a:solidFill>
+              <a:schemeClr val="tx1"/>
+            </a:solidFill>
+          </a:ln>
+        </p:spPr>
+        <p:style>
+          <a:lnRef idx="1">
+            <a:schemeClr val="accent1"/>
+          </a:lnRef>
+          <a:fillRef idx="0">
+            <a:schemeClr val="accent1"/>
+          </a:fillRef>
+          <a:effectRef idx="0">
+            <a:schemeClr val="accent1"/>
+          </a:effectRef>
+          <a:fontRef idx="minor">
+            <a:schemeClr val="tx1"/>
+          </a:fontRef>
+        </p:style>
+      </p:cxnSp>
+      <p:cxnSp>
+        <p:nvCxnSpPr>
+          <p:cNvPr id="58" name="Straight Connector 57"/>
+          <p:cNvCxnSpPr/>
+          <p:nvPr/>
+        </p:nvCxnSpPr>
+        <p:spPr>
+          <a:xfrm rot="60000" flipV="1">
+            <a:off x="3863328" y="3814853"/>
+            <a:ext cx="556225" cy="10104"/>
+          </a:xfrm>
+          <a:prstGeom prst="line">
+            <a:avLst/>
+          </a:prstGeom>
+          <a:ln w="25400">
+            <a:solidFill>
+              <a:schemeClr val="tx1"/>
+            </a:solidFill>
+          </a:ln>
+        </p:spPr>
+        <p:style>
+          <a:lnRef idx="1">
+            <a:schemeClr val="accent1"/>
+          </a:lnRef>
+          <a:fillRef idx="0">
+            <a:schemeClr val="accent1"/>
+          </a:fillRef>
+          <a:effectRef idx="0">
+            <a:schemeClr val="accent1"/>
+          </a:effectRef>
+          <a:fontRef idx="minor">
+            <a:schemeClr val="tx1"/>
+          </a:fontRef>
+        </p:style>
+      </p:cxnSp>
     </p:spTree>
     <p:extLst>
       <p:ext uri="{BB962C8B-B14F-4D97-AF65-F5344CB8AC3E}">

</xml_diff>